<commit_message>
I changed mo stuff
</commit_message>
<xml_diff>
--- a/PrototypeDemoCurtis314.pptx
+++ b/PrototypeDemoCurtis314.pptx
@@ -7,9 +7,11 @@
   <p:sldIdLst>
     <p:sldId id="256" r:id="rId2"/>
     <p:sldId id="257" r:id="rId3"/>
-    <p:sldId id="258" r:id="rId4"/>
-    <p:sldId id="259" r:id="rId5"/>
-    <p:sldId id="260" r:id="rId6"/>
+    <p:sldId id="262" r:id="rId4"/>
+    <p:sldId id="263" r:id="rId5"/>
+    <p:sldId id="258" r:id="rId6"/>
+    <p:sldId id="259" r:id="rId7"/>
+    <p:sldId id="260" r:id="rId8"/>
   </p:sldIdLst>
   <p:sldSz cx="9144000" cy="6858000" type="screen4x3"/>
   <p:notesSz cx="6858000" cy="9144000"/>
@@ -4805,34 +4807,39 @@
           <a:p>
             <a:r>
               <a:rPr lang="en-US" dirty="0" smtClean="0"/>
-              <a:t>Team Number 5</a:t>
+              <a:t>Group # 05</a:t>
+            </a:r>
+            <a:r>
+              <a:rPr lang="en-US" dirty="0" smtClean="0"/>
+              <a:t/>
             </a:r>
             <a:br>
               <a:rPr lang="en-US" dirty="0" smtClean="0"/>
             </a:br>
             <a:r>
               <a:rPr lang="en-US" dirty="0" smtClean="0"/>
-              <a:t>Team America</a:t>
+              <a:t>Team </a:t>
+            </a:r>
+            <a:r>
+              <a:rPr lang="en-US" dirty="0" smtClean="0"/>
+              <a:t>America</a:t>
+            </a:r>
+            <a:r>
+              <a:rPr lang="en-US" dirty="0" smtClean="0"/>
+              <a:t/>
             </a:r>
             <a:br>
               <a:rPr lang="en-US" dirty="0" smtClean="0"/>
             </a:br>
             <a:r>
               <a:rPr lang="en-US" dirty="0" smtClean="0"/>
-              <a:t>(alt. name): Team America</a:t>
+              <a:t>Workout Central</a:t>
             </a:r>
             <a:br>
               <a:rPr lang="en-US" dirty="0" smtClean="0"/>
             </a:br>
             <a:r>
               <a:rPr lang="en-US" dirty="0" smtClean="0"/>
-              <a:t>Workout Central</a:t>
-            </a:r>
-            <a:br>
-              <a:rPr lang="en-US" dirty="0" smtClean="0"/>
-            </a:br>
-            <a:r>
-              <a:rPr lang="en-US" dirty="0" smtClean="0"/>
               <a:t>Ryan Lin, Bryan Herrera, Seth Furman, Daniel </a:t>
             </a:r>
             <a:r>
@@ -4858,6 +4865,18 @@
           <a:bodyPr/>
           <a:lstStyle/>
           <a:p>
+            <a:r>
+              <a:rPr lang="en-US" dirty="0" smtClean="0"/>
+              <a:t>Mobile App Development (</a:t>
+            </a:r>
+            <a:r>
+              <a:rPr lang="en-US" dirty="0" err="1" smtClean="0"/>
+              <a:t>iOS</a:t>
+            </a:r>
+            <a:r>
+              <a:rPr lang="en-US" dirty="0" smtClean="0"/>
+              <a:t>)</a:t>
+            </a:r>
             <a:endParaRPr lang="en-US" dirty="0"/>
           </a:p>
         </p:txBody>
@@ -4910,70 +4929,7 @@
   <p:timing>
     <p:tnLst>
       <p:par>
-        <p:cTn xmlns:p14="http://schemas.microsoft.com/office/powerpoint/2010/main" id="1" dur="indefinite" restart="never" nodeType="tmRoot">
-          <p:childTnLst>
-            <p:seq concurrent="1" nextAc="seek">
-              <p:cTn id="2" dur="indefinite" nodeType="mainSeq">
-                <p:childTnLst>
-                  <p:par>
-                    <p:cTn id="3" fill="hold">
-                      <p:stCondLst>
-                        <p:cond delay="indefinite"/>
-                      </p:stCondLst>
-                      <p:childTnLst>
-                        <p:par>
-                          <p:cTn id="4" fill="hold">
-                            <p:stCondLst>
-                              <p:cond delay="0"/>
-                            </p:stCondLst>
-                            <p:childTnLst>
-                              <p:par>
-                                <p:cTn id="5" presetID="0" presetClass="path" presetSubtype="0" accel="50000" decel="50000" fill="hold" nodeType="clickEffect">
-                                  <p:stCondLst>
-                                    <p:cond delay="0"/>
-                                  </p:stCondLst>
-                                  <p:childTnLst>
-                                    <p:animMotion origin="layout" path="M 0.00139 -0.00185 L 0.65776 -0.69165 " pathEditMode="relative" rAng="0" ptsTypes="AA">
-                                      <p:cBhvr>
-                                        <p:cTn id="6" dur="5000" fill="hold"/>
-                                        <p:tgtEl>
-                                          <p:spTgt spid="4"/>
-                                        </p:tgtEl>
-                                        <p:attrNameLst>
-                                          <p:attrName>ppt_x</p:attrName>
-                                          <p:attrName>ppt_y</p:attrName>
-                                        </p:attrNameLst>
-                                      </p:cBhvr>
-                                      <p:rCtr x="32818" y="-34490"/>
-                                    </p:animMotion>
-                                  </p:childTnLst>
-                                </p:cTn>
-                              </p:par>
-                            </p:childTnLst>
-                          </p:cTn>
-                        </p:par>
-                      </p:childTnLst>
-                    </p:cTn>
-                  </p:par>
-                </p:childTnLst>
-              </p:cTn>
-              <p:prevCondLst>
-                <p:cond evt="onPrev" delay="0">
-                  <p:tgtEl>
-                    <p:sldTgt/>
-                  </p:tgtEl>
-                </p:cond>
-              </p:prevCondLst>
-              <p:nextCondLst>
-                <p:cond evt="onNext" delay="0">
-                  <p:tgtEl>
-                    <p:sldTgt/>
-                  </p:tgtEl>
-                </p:cond>
-              </p:nextCondLst>
-            </p:seq>
-          </p:childTnLst>
-        </p:cTn>
+        <p:cTn xmlns:p14="http://schemas.microsoft.com/office/powerpoint/2010/main" id="1" dur="indefinite" restart="never" nodeType="tmRoot"/>
       </p:par>
     </p:tnLst>
   </p:timing>
@@ -5032,22 +4988,110 @@
         </p:nvSpPr>
         <p:spPr/>
         <p:txBody>
-          <a:bodyPr/>
-          <a:lstStyle/>
-          <a:p>
-            <a:r>
-              <a:rPr lang="en-US" dirty="0" smtClean="0"/>
-              <a:t>Create an application to help users learn how to exercise </a:t>
-            </a:r>
-            <a:r>
-              <a:rPr lang="en-US" dirty="0" smtClean="0"/>
-              <a:t>efficiently. The application may also provide </a:t>
-            </a:r>
-            <a:r>
-              <a:rPr lang="en-US" dirty="0" smtClean="0"/>
-              <a:t>users with information to workouts that they have never heard of before. Images can show users how to do each exercise. In order to increase the simplicity and ease of use for the application, only buttons and titles will be in the menu and submenus. Our application is unique because users can access it anywhere. </a:t>
-            </a:r>
-            <a:endParaRPr lang="en-US" dirty="0"/>
+          <a:bodyPr>
+            <a:normAutofit/>
+          </a:bodyPr>
+          <a:lstStyle/>
+          <a:p>
+            <a:pPr>
+              <a:buFont typeface="Arial"/>
+              <a:buChar char="•"/>
+            </a:pPr>
+            <a:r>
+              <a:rPr lang="en-US" sz="1800" dirty="0" smtClean="0"/>
+              <a:t>Our intention is to create </a:t>
+            </a:r>
+            <a:r>
+              <a:rPr lang="en-US" sz="1800" dirty="0" smtClean="0"/>
+              <a:t>an application </a:t>
+            </a:r>
+            <a:r>
+              <a:rPr lang="en-US" sz="1800" dirty="0" smtClean="0"/>
+              <a:t>that</a:t>
+            </a:r>
+            <a:r>
+              <a:rPr lang="en-US" sz="1800" dirty="0" smtClean="0"/>
+              <a:t> helps </a:t>
+            </a:r>
+            <a:r>
+              <a:rPr lang="en-US" sz="1800" dirty="0" smtClean="0"/>
+              <a:t>users learn how to exercise </a:t>
+            </a:r>
+            <a:r>
+              <a:rPr lang="en-US" sz="1800" dirty="0" smtClean="0"/>
+              <a:t>efficiently, and provides them with a simple mechanism to track their fitness.</a:t>
+            </a:r>
+          </a:p>
+          <a:p>
+            <a:pPr>
+              <a:buFont typeface="Arial"/>
+              <a:buChar char="•"/>
+            </a:pPr>
+            <a:r>
+              <a:rPr lang="en-US" sz="1800" dirty="0" smtClean="0"/>
+              <a:t>The </a:t>
+            </a:r>
+            <a:r>
+              <a:rPr lang="en-US" sz="1800" dirty="0" smtClean="0"/>
+              <a:t>application may also provide users with information to workouts that they have never heard of </a:t>
+            </a:r>
+            <a:r>
+              <a:rPr lang="en-US" sz="1800" dirty="0" smtClean="0"/>
+              <a:t>before, and hopefully will inspire users to increase their physical activity. (A current proble</a:t>
+            </a:r>
+            <a:r>
+              <a:rPr lang="en-US" sz="1800" dirty="0" smtClean="0"/>
+              <a:t>m in the US and Worldwide</a:t>
+            </a:r>
+            <a:r>
+              <a:rPr lang="en-US" sz="1800" dirty="0" smtClean="0"/>
+              <a:t>)</a:t>
+            </a:r>
+          </a:p>
+          <a:p>
+            <a:pPr>
+              <a:buFont typeface="Arial"/>
+              <a:buChar char="•"/>
+            </a:pPr>
+            <a:r>
+              <a:rPr lang="en-US" sz="1800" dirty="0" smtClean="0"/>
+              <a:t>Images will show </a:t>
+            </a:r>
+            <a:r>
+              <a:rPr lang="en-US" sz="1800" dirty="0" smtClean="0"/>
+              <a:t>users how to do each </a:t>
+            </a:r>
+            <a:r>
+              <a:rPr lang="en-US" sz="1800" dirty="0" smtClean="0"/>
+              <a:t>exercise, and will be accompanied by written instructions.</a:t>
+            </a:r>
+          </a:p>
+          <a:p>
+            <a:pPr>
+              <a:buFont typeface="Arial"/>
+              <a:buChar char="•"/>
+            </a:pPr>
+            <a:r>
+              <a:rPr lang="en-US" sz="1800" dirty="0" smtClean="0"/>
+              <a:t>Our </a:t>
+            </a:r>
+            <a:r>
+              <a:rPr lang="en-US" sz="1800" dirty="0" smtClean="0"/>
+              <a:t>application is unique because </a:t>
+            </a:r>
+            <a:r>
+              <a:rPr lang="en-US" sz="1800" dirty="0" smtClean="0"/>
+              <a:t>it will provide an extremely simple user interface for the casual </a:t>
+            </a:r>
+            <a:r>
+              <a:rPr lang="en-US" sz="1800" dirty="0"/>
+              <a:t>iPhone </a:t>
+            </a:r>
+            <a:r>
+              <a:rPr lang="en-US" sz="1800" dirty="0" smtClean="0"/>
+              <a:t>user.</a:t>
+            </a:r>
+            <a:endParaRPr lang="en-US" sz="1800" dirty="0"/>
           </a:p>
         </p:txBody>
       </p:sp>
@@ -5093,8 +5137,8 @@
         </p:blipFill>
         <p:spPr>
           <a:xfrm>
-            <a:off x="6158007" y="3795582"/>
-            <a:ext cx="2617153" cy="2541294"/>
+            <a:off x="5703246" y="4160991"/>
+            <a:ext cx="2379230" cy="2310267"/>
           </a:xfrm>
           <a:prstGeom prst="rect">
             <a:avLst/>
@@ -5111,13 +5155,13 @@
   <p:clrMapOvr>
     <a:masterClrMapping/>
   </p:clrMapOvr>
-  <mc:AlternateContent xmlns:mc="http://schemas.openxmlformats.org/markup-compatibility/2006">
-    <mc:Choice xmlns:p14="http://schemas.microsoft.com/office/powerpoint/2010/main" Requires="p14">
+  <mc:AlternateContent xmlns:mc="http://schemas.openxmlformats.org/markup-compatibility/2006" xmlns:p14="http://schemas.microsoft.com/office/powerpoint/2010/main">
+    <mc:Choice Requires="p14">
       <p:transition spd="slow">
         <p14:flash/>
       </p:transition>
     </mc:Choice>
-    <mc:Fallback>
+    <mc:Fallback xmlns="">
       <p:transition xmlns:p14="http://schemas.microsoft.com/office/powerpoint/2010/main" spd="slow">
         <p:fade/>
       </p:transition>
@@ -5150,199 +5194,113 @@
           <a:chExt cx="0" cy="0"/>
         </a:xfrm>
       </p:grpSpPr>
+      <p:sp>
+        <p:nvSpPr>
+          <p:cNvPr id="2" name="Title 1"/>
+          <p:cNvSpPr>
+            <a:spLocks noGrp="1"/>
+          </p:cNvSpPr>
+          <p:nvPr>
+            <p:ph type="title"/>
+          </p:nvPr>
+        </p:nvSpPr>
+        <p:spPr/>
+        <p:txBody>
+          <a:bodyPr/>
+          <a:lstStyle/>
+          <a:p>
+            <a:r>
+              <a:rPr lang="en-US" dirty="0" smtClean="0"/>
+              <a:t>Troubles We have had</a:t>
+            </a:r>
+            <a:endParaRPr lang="en-US" dirty="0"/>
+          </a:p>
+        </p:txBody>
+      </p:sp>
+      <p:sp>
+        <p:nvSpPr>
+          <p:cNvPr id="3" name="Content Placeholder 2"/>
+          <p:cNvSpPr>
+            <a:spLocks noGrp="1"/>
+          </p:cNvSpPr>
+          <p:nvPr>
+            <p:ph idx="1"/>
+          </p:nvPr>
+        </p:nvSpPr>
+        <p:spPr/>
+        <p:txBody>
+          <a:bodyPr>
+            <a:normAutofit/>
+          </a:bodyPr>
+          <a:lstStyle/>
+          <a:p>
+            <a:pPr marL="285750" indent="-285750">
+              <a:buFont typeface="Arial"/>
+              <a:buChar char="•"/>
+            </a:pPr>
+            <a:r>
+              <a:rPr lang="en-US" sz="2000" dirty="0" smtClean="0"/>
+              <a:t>ERRORS: We’ve encountered numerous errors within the </a:t>
+            </a:r>
+            <a:r>
+              <a:rPr lang="en-US" sz="2000" dirty="0" err="1" smtClean="0"/>
+              <a:t>Xcode</a:t>
+            </a:r>
+            <a:r>
+              <a:rPr lang="en-US" sz="2000" dirty="0" smtClean="0"/>
+              <a:t> environment ranging from forgetting a single semicolon ‘;’ to misusing entire methods (aka functions) and concepts. The majority of the builds that we have created have failed in one way or another on multiple occasions due to these errors, which depending on the importance and complexity may be very difficult and frustrating to resolve.</a:t>
+            </a:r>
+            <a:endParaRPr lang="en-US" sz="2000" dirty="0"/>
+          </a:p>
+        </p:txBody>
+      </p:sp>
       <p:pic>
         <p:nvPicPr>
-          <p:cNvPr id="4" name="Content Placeholder 3"/>
+          <p:cNvPr id="6" name="Picture 5" descr="seo_errorsfound.png"/>
           <p:cNvPicPr>
-            <a:picLocks noGrp="1" noChangeAspect="1"/>
+            <a:picLocks noChangeAspect="1"/>
           </p:cNvPicPr>
-          <p:nvPr>
-            <p:ph idx="1"/>
-          </p:nvPr>
+          <p:nvPr/>
         </p:nvPicPr>
         <p:blipFill>
-          <a:blip r:embed="rId2"/>
-          <a:srcRect l="-46685" r="-46685"/>
+          <a:blip r:embed="rId2">
+            <a:extLst>
+              <a:ext uri="{28A0092B-C50C-407E-A947-70E740481C1C}">
+                <a14:useLocalDpi xmlns:a14="http://schemas.microsoft.com/office/drawing/2010/main" val="0"/>
+              </a:ext>
+            </a:extLst>
+          </a:blip>
           <a:stretch>
             <a:fillRect/>
           </a:stretch>
         </p:blipFill>
         <p:spPr>
-          <a:xfrm rot="189903">
-            <a:off x="8615658" y="1186851"/>
-            <a:ext cx="4041193" cy="3304730"/>
-          </a:xfrm>
-        </p:spPr>
-      </p:pic>
-      <p:sp>
-        <p:nvSpPr>
-          <p:cNvPr id="2" name="Title 1"/>
-          <p:cNvSpPr>
-            <a:spLocks noGrp="1"/>
-          </p:cNvSpPr>
-          <p:nvPr>
-            <p:ph type="title"/>
-          </p:nvPr>
-        </p:nvSpPr>
-        <p:spPr>
           <a:xfrm>
-            <a:off x="822960" y="365760"/>
-            <a:ext cx="7520940" cy="548640"/>
-          </a:xfrm>
-        </p:spPr>
-        <p:txBody>
-          <a:bodyPr/>
-          <a:lstStyle/>
-          <a:p>
-            <a:r>
-              <a:rPr lang="en-US" dirty="0" smtClean="0"/>
-              <a:t>Done So Far</a:t>
-            </a:r>
-            <a:endParaRPr lang="en-US" dirty="0"/>
-          </a:p>
-        </p:txBody>
-      </p:sp>
-      <p:sp>
-        <p:nvSpPr>
-          <p:cNvPr id="12" name="TextBox 11"/>
-          <p:cNvSpPr txBox="1"/>
-          <p:nvPr/>
-        </p:nvSpPr>
-        <p:spPr>
-          <a:xfrm>
-            <a:off x="166779" y="1321252"/>
-            <a:ext cx="6712645" cy="1200329"/>
+            <a:off x="5739560" y="3564685"/>
+            <a:ext cx="2728637" cy="2728637"/>
           </a:xfrm>
           <a:prstGeom prst="rect">
             <a:avLst/>
           </a:prstGeom>
-          <a:noFill/>
         </p:spPr>
-        <p:txBody>
-          <a:bodyPr wrap="none" rtlCol="0">
-            <a:spAutoFit/>
-          </a:bodyPr>
-          <a:lstStyle/>
-          <a:p>
-            <a:r>
-              <a:rPr lang="en-US" dirty="0" smtClean="0"/>
-              <a:t>So far we have completed a menu and submenu for the exercises.</a:t>
-            </a:r>
-          </a:p>
-          <a:p>
-            <a:r>
-              <a:rPr lang="en-US" dirty="0" smtClean="0"/>
-              <a:t>Also, we categorized each exercise to the body parts they are</a:t>
-            </a:r>
-          </a:p>
-          <a:p>
-            <a:r>
-              <a:rPr lang="en-US" dirty="0"/>
-              <a:t>s</a:t>
-            </a:r>
-            <a:r>
-              <a:rPr lang="en-US" dirty="0" smtClean="0"/>
-              <a:t>pecific for such as upper body, legs, and core.</a:t>
-            </a:r>
-          </a:p>
-          <a:p>
-            <a:r>
-              <a:rPr lang="en-US" dirty="0" smtClean="0"/>
-              <a:t>  </a:t>
-            </a:r>
-            <a:endParaRPr lang="en-US" dirty="0"/>
-          </a:p>
-        </p:txBody>
-      </p:sp>
+      </p:pic>
     </p:spTree>
     <p:extLst>
       <p:ext uri="{BB962C8B-B14F-4D97-AF65-F5344CB8AC3E}">
-        <p14:creationId xmlns:p14="http://schemas.microsoft.com/office/powerpoint/2010/main" val="605547221"/>
+        <p14:creationId xmlns:p14="http://schemas.microsoft.com/office/powerpoint/2010/main" val="1826742938"/>
       </p:ext>
     </p:extLst>
   </p:cSld>
   <p:clrMapOvr>
     <a:masterClrMapping/>
   </p:clrMapOvr>
-  <mc:AlternateContent xmlns:mc="http://schemas.openxmlformats.org/markup-compatibility/2006">
-    <mc:Choice xmlns:p14="http://schemas.microsoft.com/office/powerpoint/2010/main" Requires="p14">
-      <p:transition spd="slow" p14:dur="2000">
-        <p14:honeycomb/>
-      </p:transition>
-    </mc:Choice>
-    <mc:Fallback>
-      <p:transition xmlns:p14="http://schemas.microsoft.com/office/powerpoint/2010/main" spd="slow">
-        <p:fade/>
-      </p:transition>
-    </mc:Fallback>
-  </mc:AlternateContent>
+  <p:transition xmlns:p14="http://schemas.microsoft.com/office/powerpoint/2010/main" spd="slow">
+    <p:push dir="u"/>
+  </p:transition>
   <p:timing>
     <p:tnLst>
       <p:par>
-        <p:cTn xmlns:p14="http://schemas.microsoft.com/office/powerpoint/2010/main" id="1" dur="indefinite" restart="never" nodeType="tmRoot">
-          <p:childTnLst>
-            <p:seq concurrent="1" nextAc="seek">
-              <p:cTn id="2" dur="indefinite" nodeType="mainSeq">
-                <p:childTnLst>
-                  <p:par>
-                    <p:cTn id="3" fill="hold">
-                      <p:stCondLst>
-                        <p:cond delay="indefinite"/>
-                      </p:stCondLst>
-                      <p:childTnLst>
-                        <p:par>
-                          <p:cTn id="4" fill="hold">
-                            <p:stCondLst>
-                              <p:cond delay="0"/>
-                            </p:stCondLst>
-                            <p:childTnLst>
-                              <p:par>
-                                <p:cTn id="5" presetID="0" presetClass="path" presetSubtype="0" accel="50000" decel="50000" fill="hold" nodeType="clickEffect">
-                                  <p:stCondLst>
-                                    <p:cond delay="0"/>
-                                  </p:stCondLst>
-                                  <p:childTnLst>
-                                    <p:animMotion origin="layout" path="M -0.04186 0.01158 C -0.04377 0.01204 -0.04585 0.01413 -0.04759 0.01343 C -0.04932 0.01251 -0.04898 0.0081 -0.05054 0.00764 C -0.05349 0.00648 -0.05644 0.0088 -0.05922 0.00949 C -0.07242 0.01922 -0.08805 0.02386 -0.09969 0.0366 C -0.12748 0.06601 -0.10455 0.04216 -0.14901 0.08478 C -0.1544 0.08964 -0.15891 0.09682 -0.16482 0.1003 C -0.17593 0.10632 -0.18705 0.11026 -0.19816 0.11582 C -0.20216 0.09914 -0.19677 0.08269 -0.19243 0.0674 C -0.19191 0.06231 -0.19069 0.05721 -0.19087 0.05212 C -0.19121 0.0491 -0.19173 0.04424 -0.19382 0.04424 C -0.19608 0.04424 -0.19556 0.04957 -0.19677 0.05212 C -0.20094 0.0593 -0.20615 0.06555 -0.2098 0.0732 C -0.21171 0.0769 -0.21362 0.08084 -0.21553 0.08478 C -0.21657 0.08617 -0.2296 0.10979 -0.23289 0.11373 C -0.23446 0.11512 -0.24193 0.11698 -0.24297 0.11767 C -0.25721 0.12416 -0.25408 0.12184 -0.2619 0.12925 C -0.26728 0.11837 -0.26398 0.12068 -0.2777 0.13319 C -0.28673 0.14107 -0.29507 0.14987 -0.30375 0.15821 C -0.30601 0.16029 -0.3074 0.164 -0.30966 0.16585 C -0.31574 0.17002 -0.32234 0.17164 -0.32841 0.17558 C -0.34161 0.18346 -0.35412 0.19133 -0.36749 0.19875 C -0.37669 0.19481 -0.37044 0.18207 -0.36749 0.17373 C -0.36662 0.17095 -0.36367 0.1684 -0.36454 0.16585 C -0.36541 0.16354 -0.36749 0.16863 -0.36888 0.16979 C -0.37774 0.17628 -0.38798 0.18971 -0.39788 0.19295 C -0.41838 0.19921 -0.43956 0.19875 -0.46006 0.20639 C -0.45537 0.1999 -0.45398 0.19736 -0.44703 0.19295 C -0.44582 0.19203 -0.44894 0.19573 -0.44998 0.19689 C -0.45398 0.1999 -0.4578 0.20338 -0.46162 0.20639 C -0.46891 0.21172 -0.47621 0.21658 -0.48333 0.22191 C -0.48593 0.22353 -0.49045 0.2277 -0.49045 0.22793 C -0.4875 0.21936 -0.48368 0.21334 -0.48177 0.20454 C -0.49983 0.19481 -0.53144 0.21635 -0.54411 0.23349 C -0.54967 0.24809 -0.56027 0.24716 -0.5686 0.25851 C -0.56808 0.25388 -0.56739 0.24762 -0.56582 0.24322 C -0.56461 0.23905 -0.55836 0.2321 -0.56148 0.23164 C -0.57138 0.23002 -0.58076 0.23627 -0.59031 0.23928 C -0.60542 0.24368 -0.61897 0.25226 -0.63373 0.25666 C -0.63998 0.25828 -0.64641 0.25897 -0.65266 0.26059 C -0.65665 0.26152 -0.6603 0.26291 -0.66412 0.2643 C -0.66377 0.26222 -0.66134 0.25805 -0.66273 0.25851 C -0.68184 0.26384 -0.70216 0.27611 -0.72056 0.28561 C -0.73619 0.28144 -0.75252 0.28538 -0.76832 0.28376 C -0.76937 0.27913 -0.76815 0.27171 -0.77128 0.27009 C -0.77388 0.2687 -0.78534 0.2738 -0.79003 0.27588 C -0.7916 0.27774 -0.79281 0.28005 -0.79437 0.28167 C -0.79576 0.2826 -0.7982 0.28561 -0.79872 0.28376 C -0.79958 0.28098 -0.79698 0.27843 -0.79594 0.27588 C -0.79698 0.27333 -0.79681 0.2694 -0.79872 0.26824 C -0.81417 0.25897 -0.83536 0.26986 -0.85082 0.27403 C -0.87027 0.29094 -0.84769 0.27287 -0.87114 0.28561 C -0.90222 0.30206 -0.87861 0.29395 -0.89424 0.29905 C -0.90813 0.28492 -0.92567 0.28885 -0.942 0.28376 C -0.95867 0.29465 -0.96561 0.30206 -0.942 0.27218 C -0.92567 0.2511 -0.9083 0.23048 -0.89128 0.21033 C -0.89041 0.20708 -0.88642 0.20245 -0.8885 0.2006 C -0.89094 0.19828 -0.90101 0.21357 -0.90153 0.21427 C -0.90726 0.21983 -0.91664 0.22145 -0.92324 0.22376 C -0.94026 0.23535 -0.9446 0.23349 -0.96666 0.23535 C -0.99132 0.25202 -1.02588 0.25226 -1.05054 0.25666 C -1.09205 0.26361 -1.07329 0.25897 -1.10837 0.27009 C -1.11445 0.27542 -1.1273 0.28376 -1.1273 0.28399 C -1.12887 0.28237 -1.12991 0.28005 -1.13164 0.27982 C -1.13512 0.27913 -1.13876 0.28353 -1.14172 0.28167 C -1.14363 0.28028 -1.14102 0.27635 -1.14033 0.27403 C -1.13859 0.26476 -1.13616 0.25596 -1.13442 0.24693 C -1.13408 0.24438 -1.13112 0.23951 -1.13303 0.23928 C -1.1372 0.23836 -1.14102 0.24253 -1.14467 0.24507 C -1.14832 0.24716 -1.15162 0.24994 -1.15474 0.25272 C -1.15683 0.25434 -1.15856 0.25642 -1.16047 0.25851 C -1.17819 0.24948 -1.1768 0.26314 -1.1966 0.26639 C -1.21709 0.26963 -1.2223 0.27218 -1.24592 0.27218 " pathEditMode="relative" rAng="0" ptsTypes="ffffffffffffffffffffffffffffffffffffffffffffffffffffffffffffffffffffffffA">
-                                      <p:cBhvr>
-                                        <p:cTn id="6" dur="2000" fill="hold"/>
-                                        <p:tgtEl>
-                                          <p:spTgt spid="4"/>
-                                        </p:tgtEl>
-                                        <p:attrNameLst>
-                                          <p:attrName>ppt_x</p:attrName>
-                                          <p:attrName>ppt_y</p:attrName>
-                                        </p:attrNameLst>
-                                      </p:cBhvr>
-                                      <p:rCtr x="-60212" y="14269"/>
-                                    </p:animMotion>
-                                  </p:childTnLst>
-                                </p:cTn>
-                              </p:par>
-                            </p:childTnLst>
-                          </p:cTn>
-                        </p:par>
-                      </p:childTnLst>
-                    </p:cTn>
-                  </p:par>
-                </p:childTnLst>
-              </p:cTn>
-              <p:prevCondLst>
-                <p:cond evt="onPrev" delay="0">
-                  <p:tgtEl>
-                    <p:sldTgt/>
-                  </p:tgtEl>
-                </p:cond>
-              </p:prevCondLst>
-              <p:nextCondLst>
-                <p:cond evt="onNext" delay="0">
-                  <p:tgtEl>
-                    <p:sldTgt/>
-                  </p:tgtEl>
-                </p:cond>
-              </p:nextCondLst>
-            </p:seq>
-          </p:childTnLst>
-        </p:cTn>
+        <p:cTn xmlns:p14="http://schemas.microsoft.com/office/powerpoint/2010/main" id="1" dur="indefinite" restart="never" nodeType="tmRoot"/>
       </p:par>
     </p:tnLst>
   </p:timing>
@@ -5383,7 +5341,7 @@
           <a:p>
             <a:r>
               <a:rPr lang="en-US" dirty="0" smtClean="0"/>
-              <a:t>Expect Done By End</a:t>
+              <a:t>Successes We’ve had</a:t>
             </a:r>
             <a:endParaRPr lang="en-US" dirty="0"/>
           </a:p>
@@ -5404,13 +5362,383 @@
           <a:bodyPr/>
           <a:lstStyle/>
           <a:p>
+            <a:pPr>
+              <a:buFont typeface="Arial"/>
+              <a:buChar char="•"/>
+            </a:pPr>
+            <a:r>
+              <a:rPr lang="en-US" dirty="0" smtClean="0"/>
+              <a:t>In spite of our troubles with </a:t>
+            </a:r>
+            <a:r>
+              <a:rPr lang="en-US" dirty="0" err="1" smtClean="0"/>
+              <a:t>Xcode</a:t>
+            </a:r>
+            <a:r>
+              <a:rPr lang="en-US" dirty="0" smtClean="0"/>
+              <a:t> we’ve been able to create a foundation for the basis of our App. </a:t>
+            </a:r>
+          </a:p>
+          <a:p>
+            <a:pPr>
+              <a:buFont typeface="Arial"/>
+              <a:buChar char="•"/>
+            </a:pPr>
+            <a:r>
+              <a:rPr lang="en-US" dirty="0" smtClean="0"/>
+              <a:t>The Learning Curve: Using </a:t>
+            </a:r>
+            <a:r>
+              <a:rPr lang="en-US" dirty="0" err="1" smtClean="0"/>
+              <a:t>Xcode</a:t>
+            </a:r>
+            <a:r>
+              <a:rPr lang="en-US" dirty="0" smtClean="0"/>
+              <a:t> and Objective C was very challenging at the beginning. However, we have begun to progress beyond the initial and painfully slow stages of the learning curve. We are currently making slow, but steady progress in our application, and our confidence level has risen to a reasonable degree.</a:t>
+            </a:r>
+            <a:endParaRPr lang="en-US" dirty="0"/>
+          </a:p>
+        </p:txBody>
+      </p:sp>
+      <p:pic>
+        <p:nvPicPr>
+          <p:cNvPr id="6" name="Picture 5" descr="fig5a.png"/>
+          <p:cNvPicPr>
+            <a:picLocks noChangeAspect="1"/>
+          </p:cNvPicPr>
+          <p:nvPr/>
+        </p:nvPicPr>
+        <p:blipFill>
+          <a:blip r:embed="rId2">
+            <a:extLst>
+              <a:ext uri="{28A0092B-C50C-407E-A947-70E740481C1C}">
+                <a14:useLocalDpi xmlns:a14="http://schemas.microsoft.com/office/drawing/2010/main" val="0"/>
+              </a:ext>
+            </a:extLst>
+          </a:blip>
+          <a:stretch>
+            <a:fillRect/>
+          </a:stretch>
+        </p:blipFill>
+        <p:spPr>
+          <a:xfrm>
+            <a:off x="822960" y="3414294"/>
+            <a:ext cx="4470634" cy="2905912"/>
+          </a:xfrm>
+          <a:prstGeom prst="rect">
+            <a:avLst/>
+          </a:prstGeom>
+        </p:spPr>
+      </p:pic>
+    </p:spTree>
+    <p:extLst>
+      <p:ext uri="{BB962C8B-B14F-4D97-AF65-F5344CB8AC3E}">
+        <p14:creationId xmlns:p14="http://schemas.microsoft.com/office/powerpoint/2010/main" val="316046575"/>
+      </p:ext>
+    </p:extLst>
+  </p:cSld>
+  <p:clrMapOvr>
+    <a:masterClrMapping/>
+  </p:clrMapOvr>
+  <mc:AlternateContent xmlns:mc="http://schemas.openxmlformats.org/markup-compatibility/2006">
+    <mc:Choice xmlns:p14="http://schemas.microsoft.com/office/powerpoint/2010/main" Requires="p14">
+      <p:transition spd="slow" p14:dur="1600">
+        <p:blinds dir="vert"/>
+      </p:transition>
+    </mc:Choice>
+    <mc:Fallback>
+      <p:transition xmlns:p14="http://schemas.microsoft.com/office/powerpoint/2010/main" spd="slow">
+        <p:blinds dir="vert"/>
+      </p:transition>
+    </mc:Fallback>
+  </mc:AlternateContent>
+  <p:timing>
+    <p:tnLst>
+      <p:par>
+        <p:cTn xmlns:p14="http://schemas.microsoft.com/office/powerpoint/2010/main" id="1" dur="indefinite" restart="never" nodeType="tmRoot"/>
+      </p:par>
+    </p:tnLst>
+  </p:timing>
+</p:sld>
+</file>
+
+<file path=ppt/slides/slide5.xml><?xml version="1.0" encoding="utf-8"?>
+<p:sld xmlns:a="http://schemas.openxmlformats.org/drawingml/2006/main" xmlns:r="http://schemas.openxmlformats.org/officeDocument/2006/relationships" xmlns:p="http://schemas.openxmlformats.org/presentationml/2006/main">
+  <p:cSld>
+    <p:spTree>
+      <p:nvGrpSpPr>
+        <p:cNvPr id="1" name=""/>
+        <p:cNvGrpSpPr/>
+        <p:nvPr/>
+      </p:nvGrpSpPr>
+      <p:grpSpPr>
+        <a:xfrm>
+          <a:off x="0" y="0"/>
+          <a:ext cx="0" cy="0"/>
+          <a:chOff x="0" y="0"/>
+          <a:chExt cx="0" cy="0"/>
+        </a:xfrm>
+      </p:grpSpPr>
+      <p:pic>
+        <p:nvPicPr>
+          <p:cNvPr id="4" name="Content Placeholder 3"/>
+          <p:cNvPicPr>
+            <a:picLocks noGrp="1" noChangeAspect="1"/>
+          </p:cNvPicPr>
+          <p:nvPr>
+            <p:ph idx="1"/>
+          </p:nvPr>
+        </p:nvPicPr>
+        <p:blipFill>
+          <a:blip r:embed="rId2"/>
+          <a:srcRect l="-46685" r="-46685"/>
+          <a:stretch>
+            <a:fillRect/>
+          </a:stretch>
+        </p:blipFill>
+        <p:spPr>
+          <a:xfrm>
+            <a:off x="1065255" y="3778250"/>
+            <a:ext cx="4697369" cy="2797564"/>
+          </a:xfrm>
+        </p:spPr>
+      </p:pic>
+      <p:sp>
+        <p:nvSpPr>
+          <p:cNvPr id="2" name="Title 1"/>
+          <p:cNvSpPr>
+            <a:spLocks noGrp="1"/>
+          </p:cNvSpPr>
+          <p:nvPr>
+            <p:ph type="title"/>
+          </p:nvPr>
+        </p:nvSpPr>
+        <p:spPr>
+          <a:xfrm>
+            <a:off x="822960" y="365760"/>
+            <a:ext cx="7520940" cy="548640"/>
+          </a:xfrm>
+        </p:spPr>
+        <p:txBody>
+          <a:bodyPr/>
+          <a:lstStyle/>
+          <a:p>
+            <a:r>
+              <a:rPr lang="en-US" dirty="0" smtClean="0"/>
+              <a:t>Done So Far</a:t>
+            </a:r>
+            <a:endParaRPr lang="en-US" dirty="0"/>
+          </a:p>
+        </p:txBody>
+      </p:sp>
+      <p:sp>
+        <p:nvSpPr>
+          <p:cNvPr id="12" name="TextBox 11"/>
+          <p:cNvSpPr txBox="1"/>
+          <p:nvPr/>
+        </p:nvSpPr>
+        <p:spPr>
+          <a:xfrm>
+            <a:off x="166779" y="1321252"/>
+            <a:ext cx="8691471" cy="2031325"/>
+          </a:xfrm>
+          <a:prstGeom prst="rect">
+            <a:avLst/>
+          </a:prstGeom>
+          <a:noFill/>
+        </p:spPr>
+        <p:txBody>
+          <a:bodyPr wrap="square" rtlCol="0">
+            <a:spAutoFit/>
+          </a:bodyPr>
+          <a:lstStyle/>
+          <a:p>
+            <a:pPr marL="285750" indent="-285750">
+              <a:buFont typeface="Arial"/>
+              <a:buChar char="•"/>
+            </a:pPr>
+            <a:r>
+              <a:rPr lang="en-US" dirty="0" smtClean="0"/>
+              <a:t>So far we have completed a menu and submenu for the </a:t>
+            </a:r>
+            <a:r>
+              <a:rPr lang="en-US" dirty="0" smtClean="0"/>
+              <a:t>exercises. Also</a:t>
+            </a:r>
+            <a:r>
+              <a:rPr lang="en-US" dirty="0" smtClean="0"/>
+              <a:t>, we categorized each exercise to the body parts they </a:t>
+            </a:r>
+            <a:r>
+              <a:rPr lang="en-US" dirty="0" smtClean="0"/>
+              <a:t>are specific for, </a:t>
+            </a:r>
+            <a:r>
+              <a:rPr lang="en-US" dirty="0" smtClean="0"/>
+              <a:t>such as upper body, legs, and </a:t>
+            </a:r>
+            <a:r>
+              <a:rPr lang="en-US" dirty="0" smtClean="0"/>
+              <a:t>core.</a:t>
+            </a:r>
+          </a:p>
+          <a:p>
+            <a:pPr marL="285750" indent="-285750">
+              <a:buFont typeface="Arial"/>
+              <a:buChar char="•"/>
+            </a:pPr>
+            <a:r>
+              <a:rPr lang="en-US" dirty="0" smtClean="0"/>
+              <a:t>We have begun creating a “Workout Queue”, which will allow users to add exercises to an editable list and edit information related to that exercise (</a:t>
+            </a:r>
+            <a:r>
+              <a:rPr lang="en-US" dirty="0" err="1" smtClean="0"/>
+              <a:t>ie</a:t>
+            </a:r>
+            <a:r>
+              <a:rPr lang="en-US" dirty="0" smtClean="0"/>
+              <a:t> reps, time exercised, distance traveled).</a:t>
+            </a:r>
+          </a:p>
+          <a:p>
+            <a:pPr marL="285750" indent="-285750">
+              <a:buFont typeface="Arial"/>
+              <a:buChar char="•"/>
+            </a:pPr>
+            <a:r>
+              <a:rPr lang="en-US" dirty="0" smtClean="0"/>
+              <a:t>Also, we’ve begun to create an alphabetized user interface table view.</a:t>
+            </a:r>
+            <a:endParaRPr lang="en-US" dirty="0" smtClean="0"/>
+          </a:p>
+        </p:txBody>
+      </p:sp>
+    </p:spTree>
+    <p:extLst>
+      <p:ext uri="{BB962C8B-B14F-4D97-AF65-F5344CB8AC3E}">
+        <p14:creationId xmlns:p14="http://schemas.microsoft.com/office/powerpoint/2010/main" val="605547221"/>
+      </p:ext>
+    </p:extLst>
+  </p:cSld>
+  <p:clrMapOvr>
+    <a:masterClrMapping/>
+  </p:clrMapOvr>
+  <mc:AlternateContent xmlns:mc="http://schemas.openxmlformats.org/markup-compatibility/2006" xmlns:p14="http://schemas.microsoft.com/office/powerpoint/2010/main">
+    <mc:Choice Requires="p14">
+      <p:transition spd="slow" p14:dur="2000">
+        <p14:honeycomb/>
+      </p:transition>
+    </mc:Choice>
+    <mc:Fallback xmlns="">
+      <p:transition xmlns:p14="http://schemas.microsoft.com/office/powerpoint/2010/main" spd="slow">
+        <p:fade/>
+      </p:transition>
+    </mc:Fallback>
+  </mc:AlternateContent>
+  <p:timing>
+    <p:tnLst>
+      <p:par>
+        <p:cTn xmlns:p14="http://schemas.microsoft.com/office/powerpoint/2010/main" id="1" dur="indefinite" restart="never" nodeType="tmRoot"/>
+      </p:par>
+    </p:tnLst>
+  </p:timing>
+</p:sld>
+</file>
+
+<file path=ppt/slides/slide6.xml><?xml version="1.0" encoding="utf-8"?>
+<p:sld xmlns:a="http://schemas.openxmlformats.org/drawingml/2006/main" xmlns:r="http://schemas.openxmlformats.org/officeDocument/2006/relationships" xmlns:p="http://schemas.openxmlformats.org/presentationml/2006/main">
+  <p:cSld>
+    <p:spTree>
+      <p:nvGrpSpPr>
+        <p:cNvPr id="1" name=""/>
+        <p:cNvGrpSpPr/>
+        <p:nvPr/>
+      </p:nvGrpSpPr>
+      <p:grpSpPr>
+        <a:xfrm>
+          <a:off x="0" y="0"/>
+          <a:ext cx="0" cy="0"/>
+          <a:chOff x="0" y="0"/>
+          <a:chExt cx="0" cy="0"/>
+        </a:xfrm>
+      </p:grpSpPr>
+      <p:sp>
+        <p:nvSpPr>
+          <p:cNvPr id="2" name="Title 1"/>
+          <p:cNvSpPr>
+            <a:spLocks noGrp="1"/>
+          </p:cNvSpPr>
+          <p:nvPr>
+            <p:ph type="title"/>
+          </p:nvPr>
+        </p:nvSpPr>
+        <p:spPr/>
+        <p:txBody>
+          <a:bodyPr/>
+          <a:lstStyle/>
+          <a:p>
+            <a:r>
+              <a:rPr lang="en-US" dirty="0" smtClean="0"/>
+              <a:t>Expect Done By </a:t>
+            </a:r>
+            <a:r>
+              <a:rPr lang="en-US" dirty="0" smtClean="0"/>
+              <a:t>End</a:t>
+            </a:r>
+            <a:endParaRPr lang="en-US" dirty="0"/>
+          </a:p>
+        </p:txBody>
+      </p:sp>
+      <p:sp>
+        <p:nvSpPr>
+          <p:cNvPr id="3" name="Content Placeholder 2"/>
+          <p:cNvSpPr>
+            <a:spLocks noGrp="1"/>
+          </p:cNvSpPr>
+          <p:nvPr>
+            <p:ph idx="1"/>
+          </p:nvPr>
+        </p:nvSpPr>
+        <p:spPr/>
+        <p:txBody>
+          <a:bodyPr/>
+          <a:lstStyle/>
+          <a:p>
+            <a:pPr marL="285750" indent="-285750">
+              <a:buFont typeface="Arial"/>
+              <a:buChar char="•"/>
+            </a:pPr>
+            <a:r>
+              <a:rPr lang="en-US" dirty="0" smtClean="0"/>
+              <a:t>The </a:t>
+            </a:r>
             <a:r>
               <a:rPr lang="en-US" dirty="0"/>
-              <a:t>	The fully released application will have text segments to guide users through respective workouts. The application will not include video segments or graphs to assist users. However, the text-based documents will feature a variety of images to clarify how to complete individual </a:t>
+              <a:t>fully released application will have text segments to guide users through respective workouts. The application will not include video segments or graphs to assist users. However, the text-based documents will feature a variety of images to clarify how to complete individual </a:t>
             </a:r>
             <a:r>
               <a:rPr lang="en-US" dirty="0" smtClean="0"/>
-              <a:t>exercise activities.</a:t>
+              <a:t>exercise activities</a:t>
+            </a:r>
+            <a:r>
+              <a:rPr lang="en-US" dirty="0" smtClean="0"/>
+              <a:t>. We also expect to create the previously mentioned “Workout Queue”, which (time </a:t>
+            </a:r>
+            <a:r>
+              <a:rPr lang="en-US" dirty="0"/>
+              <a:t>p</a:t>
+            </a:r>
+            <a:r>
+              <a:rPr lang="en-US" dirty="0" smtClean="0"/>
+              <a:t>ermitting) may incorporate some of the integrations in the following slide (</a:t>
+            </a:r>
+            <a:r>
+              <a:rPr lang="en-US" dirty="0" err="1" smtClean="0"/>
+              <a:t>ie</a:t>
+            </a:r>
+            <a:r>
+              <a:rPr lang="en-US" dirty="0" smtClean="0"/>
+              <a:t> Added labels and fields, data logs, progress tracking integration, etc.)</a:t>
             </a:r>
             <a:endParaRPr lang="en-US" dirty="0"/>
           </a:p>
@@ -5432,7 +5760,7 @@
         </p:blipFill>
         <p:spPr>
           <a:xfrm>
-            <a:off x="4004597" y="3835477"/>
+            <a:off x="4127005" y="3835477"/>
             <a:ext cx="1738870" cy="2612037"/>
           </a:xfrm>
           <a:prstGeom prst="rect">
@@ -5456,7 +5784,7 @@
         </p:blipFill>
         <p:spPr>
           <a:xfrm>
-            <a:off x="7134528" y="3835477"/>
+            <a:off x="6889712" y="3789580"/>
             <a:ext cx="1621066" cy="2535070"/>
           </a:xfrm>
           <a:prstGeom prst="rect">
@@ -5480,7 +5808,7 @@
         </p:blipFill>
         <p:spPr>
           <a:xfrm>
-            <a:off x="1119537" y="4555288"/>
+            <a:off x="752313" y="4417597"/>
             <a:ext cx="2683168" cy="1691793"/>
           </a:xfrm>
           <a:prstGeom prst="rect">
@@ -5498,13 +5826,13 @@
   <p:clrMapOvr>
     <a:masterClrMapping/>
   </p:clrMapOvr>
-  <mc:AlternateContent xmlns:mc="http://schemas.openxmlformats.org/markup-compatibility/2006">
-    <mc:Choice xmlns:p14="http://schemas.microsoft.com/office/powerpoint/2010/main" Requires="p14">
+  <mc:AlternateContent xmlns:mc="http://schemas.openxmlformats.org/markup-compatibility/2006" xmlns:p14="http://schemas.microsoft.com/office/powerpoint/2010/main">
+    <mc:Choice Requires="p14">
       <p:transition spd="slow" p14:dur="2000">
         <p14:ferris dir="l"/>
       </p:transition>
     </mc:Choice>
-    <mc:Fallback>
+    <mc:Fallback xmlns="">
       <p:transition xmlns:p14="http://schemas.microsoft.com/office/powerpoint/2010/main" spd="slow">
         <p:fade/>
       </p:transition>
@@ -5513,231 +5841,14 @@
   <p:timing>
     <p:tnLst>
       <p:par>
-        <p:cTn xmlns:p14="http://schemas.microsoft.com/office/powerpoint/2010/main" id="1" dur="indefinite" restart="never" nodeType="tmRoot">
-          <p:childTnLst>
-            <p:seq concurrent="1" nextAc="seek">
-              <p:cTn id="2" dur="indefinite" nodeType="mainSeq">
-                <p:childTnLst>
-                  <p:par>
-                    <p:cTn id="3" fill="hold">
-                      <p:stCondLst>
-                        <p:cond delay="indefinite"/>
-                        <p:cond evt="onBegin" delay="0">
-                          <p:tn val="2"/>
-                        </p:cond>
-                      </p:stCondLst>
-                      <p:childTnLst>
-                        <p:par>
-                          <p:cTn id="4" fill="hold">
-                            <p:stCondLst>
-                              <p:cond delay="0"/>
-                            </p:stCondLst>
-                            <p:childTnLst>
-                              <p:par>
-                                <p:cTn id="5" presetID="55" presetClass="path" presetSubtype="0" accel="50000" decel="50000" fill="hold" nodeType="afterEffect">
-                                  <p:stCondLst>
-                                    <p:cond delay="0"/>
-                                  </p:stCondLst>
-                                  <p:childTnLst>
-                                    <p:animMotion origin="layout" path="M -0.00572 0.0037 C -0.00173 -0.08558 -0.05171 -0.16285 -0.1187 -0.16817 C -0.18274 -0.17487 -0.24279 -0.11496 -0.24679 -0.02822 C -0.25164 0.05159 -0.20965 0.12631 -0.14977 0.13163 C -0.09475 0.13556 -0.04269 0.08629 -0.0387 0.0118 C -0.03471 -0.05621 -0.06976 -0.12028 -0.12079 -0.1256 C -0.16765 -0.12954 -0.21173 -0.08836 -0.21468 -0.02567 C -0.2178 0.03031 -0.18969 0.08513 -0.14769 0.08767 C -0.10968 0.09161 -0.07375 0.05968 -0.0708 0.00903 C -0.06872 -0.03631 -0.08972 -0.08026 -0.1227 -0.08304 C -0.15168 -0.08558 -0.18066 -0.06153 -0.18274 -0.0229 C -0.18465 0.01041 -0.16973 0.04234 -0.14578 0.04511 C -0.12565 0.04766 -0.10465 0.03308 -0.10378 0.00648 C -0.1017 -0.01503 -0.10968 -0.0377 -0.12478 -0.04025 C -0.13675 -0.04025 -0.14873 -0.03493 -0.15064 -0.02035 C -0.15168 -0.01087 -0.14977 -0.00162 -0.1437 0.00232 C -0.14075 0.0037 -0.13866 0.0037 -0.13571 0.00232 " pathEditMode="relative" rAng="0" ptsTypes="fffffffffffffffff">
-                                      <p:cBhvr>
-                                        <p:cTn id="6" dur="470" fill="hold"/>
-                                        <p:tgtEl>
-                                          <p:spTgt spid="4"/>
-                                        </p:tgtEl>
-                                        <p:attrNameLst>
-                                          <p:attrName>ppt_x</p:attrName>
-                                          <p:attrName>ppt_y</p:attrName>
-                                        </p:attrNameLst>
-                                      </p:cBhvr>
-                                      <p:rCtr x="-12096" y="-2336"/>
-                                    </p:animMotion>
-                                  </p:childTnLst>
-                                </p:cTn>
-                              </p:par>
-                            </p:childTnLst>
-                          </p:cTn>
-                        </p:par>
-                        <p:par>
-                          <p:cTn id="7" fill="hold">
-                            <p:stCondLst>
-                              <p:cond delay="470"/>
-                            </p:stCondLst>
-                            <p:childTnLst>
-                              <p:par>
-                                <p:cTn id="8" presetID="55" presetClass="path" presetSubtype="0" accel="50000" decel="50000" fill="hold" nodeType="afterEffect">
-                                  <p:stCondLst>
-                                    <p:cond delay="0"/>
-                                  </p:stCondLst>
-                                  <p:childTnLst>
-                                    <p:animMotion origin="layout" path="M 0 0  C 0.004 -0.0893  -0.046 -0.16661  -0.113 -0.17194  C -0.177 -0.1786  -0.237 -0.11863  -0.241 -0.03199  C -0.246 0.04798  -0.204 0.12262  -0.144 0.12796  C -0.089 0.13195  -0.037 0.08264  -0.033 0.008  C -0.029 -0.05998  -0.064 -0.12396  -0.115 -0.12929  C -0.162 -0.13329  -0.206 -0.09197  -0.209 -0.02932  C -0.212 0.02666  -0.184 0.08131  -0.142 0.08397  C -0.104 0.08797  -0.068 0.05598  -0.065 0.00533  C -0.063 -0.03999  -0.084 -0.08397  -0.117 -0.08664  C -0.146 -0.0893  -0.175 -0.06531  -0.177 -0.02666  C -0.179 0.00666  -0.164 0.03865  -0.14 0.04132  C -0.12 0.04398  -0.099 0.02932  -0.098 0.00267  C -0.096 -0.01866  -0.104 -0.04132  -0.119 -0.04398  C -0.131 -0.04398  -0.143 -0.03865  -0.145 -0.02399  C -0.146 -0.01466  -0.144 -0.00533  -0.138 -0.00133  C -0.135 0  -0.133 0  -0.13 -0.00133  E" pathEditMode="relative" ptsTypes="">
-                                      <p:cBhvr>
-                                        <p:cTn id="9" dur="340" fill="hold"/>
-                                        <p:tgtEl>
-                                          <p:spTgt spid="5"/>
-                                        </p:tgtEl>
-                                        <p:attrNameLst>
-                                          <p:attrName>ppt_x</p:attrName>
-                                          <p:attrName>ppt_y</p:attrName>
-                                        </p:attrNameLst>
-                                      </p:cBhvr>
-                                    </p:animMotion>
-                                  </p:childTnLst>
-                                </p:cTn>
-                              </p:par>
-                            </p:childTnLst>
-                          </p:cTn>
-                        </p:par>
-                        <p:par>
-                          <p:cTn id="10" fill="hold">
-                            <p:stCondLst>
-                              <p:cond delay="810"/>
-                            </p:stCondLst>
-                            <p:childTnLst>
-                              <p:par>
-                                <p:cTn id="11" presetID="55" presetClass="path" presetSubtype="0" accel="50000" decel="50000" fill="hold" nodeType="afterEffect">
-                                  <p:stCondLst>
-                                    <p:cond delay="0"/>
-                                  </p:stCondLst>
-                                  <p:childTnLst>
-                                    <p:animMotion origin="layout" path="M 0.00799 -0.01619 C 0.01198 -0.10548 -0.038 -0.18274 -0.10499 -0.18806 C -0.16903 -0.19477 -0.22908 -0.13486 -0.23307 -0.04811 C -0.23793 0.03169 -0.19594 0.10641 -0.13606 0.11173 C -0.08104 0.11566 -0.02898 0.06639 -0.02499 -0.00809 C -0.021 -0.0761 -0.05605 -0.14018 -0.10708 -0.1455 C -0.15394 -0.14943 -0.19802 -0.10825 -0.20097 -0.04557 C -0.20409 0.01041 -0.17598 0.06524 -0.13398 0.06778 C -0.09597 0.07171 -0.06004 0.03979 -0.05709 -0.01087 C -0.05501 -0.05621 -0.07601 -0.10016 -0.10899 -0.10293 C -0.13797 -0.10548 -0.16695 -0.08142 -0.16903 -0.04279 C -0.17094 -0.00948 -0.15602 0.02244 -0.13207 0.02522 C -0.11194 0.02776 -0.09094 0.01319 -0.09007 -0.01341 C -0.08799 -0.03493 -0.09597 -0.0576 -0.11107 -0.06014 C -0.12304 -0.06014 -0.13502 -0.05482 -0.13693 -0.04025 C -0.13797 -0.03076 -0.13606 -0.02151 -0.12999 -0.01758 C -0.12704 -0.01619 -0.12495 -0.01619 -0.122 -0.01758 " pathEditMode="relative" rAng="0" ptsTypes="fffffffffffffffff">
-                                      <p:cBhvr>
-                                        <p:cTn id="12" dur="250" fill="hold"/>
-                                        <p:tgtEl>
-                                          <p:spTgt spid="6"/>
-                                        </p:tgtEl>
-                                        <p:attrNameLst>
-                                          <p:attrName>ppt_x</p:attrName>
-                                          <p:attrName>ppt_y</p:attrName>
-                                        </p:attrNameLst>
-                                      </p:cBhvr>
-                                      <p:rCtr x="-12096" y="-2336"/>
-                                    </p:animMotion>
-                                  </p:childTnLst>
-                                </p:cTn>
-                              </p:par>
-                            </p:childTnLst>
-                          </p:cTn>
-                        </p:par>
-                        <p:par>
-                          <p:cTn id="13" fill="hold">
-                            <p:stCondLst>
-                              <p:cond delay="1060"/>
-                            </p:stCondLst>
-                            <p:childTnLst>
-                              <p:par>
-                                <p:cTn id="14" presetID="0" presetClass="path" presetSubtype="0" accel="50000" decel="50000" fill="hold" nodeType="afterEffect">
-                                  <p:stCondLst>
-                                    <p:cond delay="0"/>
-                                  </p:stCondLst>
-                                  <p:childTnLst>
-                                    <p:animMotion origin="layout" path="M 9.28844E-6 -1.35785E-6 C -0.0026 -0.03863 -0.017 -0.10872 0.01406 -0.13463 C 0.02187 -0.14133 0.03177 -0.14203 0.04079 -0.14573 C 0.09945 -0.13763 0.10622 -0.1455 0.14735 -0.12144 C 0.16071 -0.11358 0.18518 -0.0916 0.18518 -0.0916 C 0.18414 -0.0997 0.18067 -0.10802 0.18241 -0.11589 C 0.18657 -0.13648 0.21 -0.15244 0.22163 -0.15891 C 0.25599 -0.17858 0.26831 -0.17696 0.3058 -0.1832 C 0.32021 -0.18205 0.33513 -0.18482 0.34919 -0.1795 C 0.35197 -0.17858 0.3485 -0.17094 0.34624 -0.16817 C 0.34155 -0.16238 0.33513 -0.15938 0.32958 -0.15498 C 0.32541 -0.15891 0.31621 -0.15984 0.31708 -0.16632 C 0.31795 -0.17441 0.3268 -0.1765 0.33253 -0.1795 C 0.34607 -0.18714 0.35978 -0.19477 0.37453 -0.19801 C 0.39987 -0.20402 0.56908 -0.21836 0.5722 -0.2186 C 0.64561 -0.23224 0.71625 -0.25329 0.78966 -0.23178 C 0.79105 -0.22368 0.79643 -0.21513 0.79383 -0.20749 C 0.78723 -0.18945 0.75651 -0.16701 0.74471 -0.15891 C 0.74107 -0.1566 0.75148 -0.1647 0.7546 -0.16817 C 0.7612 -0.17626 0.77717 -0.20102 0.7855 -0.20564 C 0.82142 -0.22715 0.8957 -0.21836 0.92017 -0.2186 C 0.96113 -0.2216 1.00244 -0.22322 1.04357 -0.22808 C 1.07567 -0.25075 1.10865 -0.27249 1.14457 -0.28221 C 1.16644 -0.28845 1.16314 -0.291 1.17113 -0.28036 " pathEditMode="relative" ptsTypes="fffffffffffffffffffffffA">
-                                      <p:cBhvr>
-                                        <p:cTn id="15" dur="6000" fill="hold"/>
-                                        <p:tgtEl>
-                                          <p:spTgt spid="6"/>
-                                        </p:tgtEl>
-                                        <p:attrNameLst>
-                                          <p:attrName>ppt_x</p:attrName>
-                                          <p:attrName>ppt_y</p:attrName>
-                                        </p:attrNameLst>
-                                      </p:cBhvr>
-                                    </p:animMotion>
-                                  </p:childTnLst>
-                                </p:cTn>
-                              </p:par>
-                            </p:childTnLst>
-                          </p:cTn>
-                        </p:par>
-                        <p:par>
-                          <p:cTn id="16" fill="hold">
-                            <p:stCondLst>
-                              <p:cond delay="7060"/>
-                            </p:stCondLst>
-                            <p:childTnLst>
-                              <p:par>
-                                <p:cTn id="17" presetID="0" presetClass="path" presetSubtype="0" accel="50000" decel="50000" fill="hold" nodeType="afterEffect">
-                                  <p:stCondLst>
-                                    <p:cond delay="0"/>
-                                  </p:stCondLst>
-                                  <p:childTnLst>
-                                    <p:animMotion origin="layout" path="M 4.23464E-7 1.91996E-7 C -0.00139 0.00046 -0.00278 0.00138 -0.00416 0.00185 C -0.00746 0.00254 -0.01093 0.00231 -0.01406 0.0037 C -0.01579 0.00416 -0.01683 0.00624 -0.01822 0.0074 C -0.02395 0.0111 -0.03211 0.01249 -0.03783 0.0148 C -0.05259 0.0266 -0.03697 0.0155 -0.05328 0.02243 C -0.07619 0.03169 -0.08469 0.03678 -0.1109 0.03932 C -0.12062 0.02614 -0.12634 0.00601 -0.13051 -0.01134 C -0.1404 -0.0081 -0.14786 0.00462 -0.15706 0.0111 C -0.20305 0.0421 -0.24991 0.07333 -0.30163 0.07841 C -0.32385 0.08258 -0.33929 0.07286 -0.35908 0.06361 C -0.39396 0.04719 -0.43041 0.03562 -0.46702 0.03169 C -0.46893 0.03215 -0.47449 0.03192 -0.47275 0.03354 C -0.46893 0.03701 -0.44898 0.04672 -0.44186 0.05042 C -0.43908 0.05343 -0.43613 0.05621 -0.43336 0.05968 C -0.43006 0.06384 -0.42364 0.07286 -0.42364 0.07286 C -0.42086 0.07217 -0.41774 0.07286 -0.41513 0.07101 C -0.41184 0.06824 -0.4068 0.05968 -0.4068 0.05968 C -0.42138 0.0576 -0.43474 0.05713 -0.4488 0.06361 C -0.44568 0.06477 -0.43856 0.06268 -0.43908 0.06731 C -0.43978 0.07263 -0.44655 0.07217 -0.45019 0.07471 C -0.47154 0.0879 -0.49288 0.09414 -0.51614 0.09715 C -0.53106 0.11011 -0.50746 0.13648 -0.49653 0.14018 C -0.52239 0.16262 -0.49445 0.14064 -0.52881 0.15891 C -0.55901 0.17488 -0.5597 0.17603 -0.57931 0.19061 C -0.58417 0.21027 -0.57792 0.1802 -0.57792 0.20194 C -0.57792 0.22276 -0.6109 0.21489 -0.61298 0.21489 " pathEditMode="relative" ptsTypes="ffffffffffffffffffffffffffA">
-                                      <p:cBhvr>
-                                        <p:cTn id="18" dur="870" fill="hold"/>
-                                        <p:tgtEl>
-                                          <p:spTgt spid="4"/>
-                                        </p:tgtEl>
-                                        <p:attrNameLst>
-                                          <p:attrName>ppt_x</p:attrName>
-                                          <p:attrName>ppt_y</p:attrName>
-                                        </p:attrNameLst>
-                                      </p:cBhvr>
-                                    </p:animMotion>
-                                  </p:childTnLst>
-                                </p:cTn>
-                              </p:par>
-                            </p:childTnLst>
-                          </p:cTn>
-                        </p:par>
-                        <p:par>
-                          <p:cTn id="19" fill="hold">
-                            <p:stCondLst>
-                              <p:cond delay="7930"/>
-                            </p:stCondLst>
-                            <p:childTnLst>
-                              <p:par>
-                                <p:cTn id="20" presetID="0" presetClass="path" presetSubtype="0" accel="50000" decel="50000" fill="hold" nodeType="afterEffect">
-                                  <p:stCondLst>
-                                    <p:cond delay="0"/>
-                                  </p:stCondLst>
-                                  <p:childTnLst>
-                                    <p:animMotion origin="layout" path="M -7.63624E-8 -4.34189E-6 C 0.01024 -0.00069 0.02048 0.00046 0.03072 -0.00185 C 0.05675 -0.00833 0.09111 -0.05112 0.10656 -0.07842 C 0.10743 -0.08235 0.10777 -0.08628 0.10934 -0.08975 C 0.1102 -0.09207 0.11246 -0.09299 0.1135 -0.0953 C 0.11454 -0.09831 0.11367 -0.10178 0.11489 -0.10456 C 0.11715 -0.11103 0.122 -0.11127 0.12617 -0.11404 C 0.13485 -0.12052 0.14162 -0.12769 0.15133 -0.1307 C 0.15567 -0.12538 0.15689 -0.12168 0.16262 -0.11774 C 0.19229 -0.12283 0.21815 -0.14481 0.24818 -0.15128 C 0.25599 -0.15082 0.26397 -0.15105 0.27195 -0.14943 C 0.27351 -0.1492 0.27733 -0.14758 0.27629 -0.14573 C 0.2697 -0.13463 0.24297 -0.12121 0.2369 -0.11774 C 0.15342 -0.07402 0.23776 -0.12029 0.14717 -0.07842 C 0.13068 -0.07102 0.10621 -0.05876 0.09111 -0.04303 C 0.08955 -0.04164 0.09476 -0.04441 0.09667 -0.04488 C 0.09892 -0.04557 0.10135 -0.04626 0.10378 -0.04673 C 0.10604 -0.04626 0.10968 -0.04788 0.11072 -0.04488 C 0.1109 -0.04418 0.10881 -0.02406 0.10795 -0.02059 C 0.10101 0.00416 0.09111 0.00995 0.08122 0.03007 C 0.07497 0.0421 0.07202 0.05552 0.06872 0.06916 C 0.0682 0.07657 0.06925 0.08443 0.06734 0.0916 C 0.06647 0.09392 0.06334 0.0923 0.06161 0.09345 C 0.05241 0.09831 0.05033 0.10247 0.04061 0.10479 C 0.03332 0.10941 0.02568 0.11173 0.01822 0.11589 C 0.0092 0.12769 0.01267 0.12144 0.00694 0.13463 C 0.00243 0.15822 0.01753 0.16771 0.03072 0.17765 C 0.06872 0.20634 0.06196 0.20472 0.10378 0.20749 C 0.15116 0.22299 0.08938 0.20449 0.19767 0.21513 C 0.21364 0.21652 0.22648 0.23016 0.24123 0.23733 C 0.24991 0.2415 0.25859 0.24312 0.26779 0.24497 C 0.29122 0.25538 0.27247 0.25052 0.32246 0.24867 C 0.32801 0.24682 0.33374 0.24543 0.33929 0.24312 C 0.34224 0.24173 0.34779 0.23733 0.34779 0.23733 " pathEditMode="relative" ptsTypes="fffffffffffffffffffffffffffffffffA">
-                                      <p:cBhvr>
-                                        <p:cTn id="21" dur="1000" fill="hold"/>
-                                        <p:tgtEl>
-                                          <p:spTgt spid="5"/>
-                                        </p:tgtEl>
-                                        <p:attrNameLst>
-                                          <p:attrName>ppt_x</p:attrName>
-                                          <p:attrName>ppt_y</p:attrName>
-                                        </p:attrNameLst>
-                                      </p:cBhvr>
-                                    </p:animMotion>
-                                  </p:childTnLst>
-                                </p:cTn>
-                              </p:par>
-                            </p:childTnLst>
-                          </p:cTn>
-                        </p:par>
-                      </p:childTnLst>
-                    </p:cTn>
-                  </p:par>
-                </p:childTnLst>
-              </p:cTn>
-              <p:prevCondLst>
-                <p:cond evt="onPrev" delay="0">
-                  <p:tgtEl>
-                    <p:sldTgt/>
-                  </p:tgtEl>
-                </p:cond>
-              </p:prevCondLst>
-              <p:nextCondLst>
-                <p:cond evt="onNext" delay="0">
-                  <p:tgtEl>
-                    <p:sldTgt/>
-                  </p:tgtEl>
-                </p:cond>
-              </p:nextCondLst>
-            </p:seq>
-          </p:childTnLst>
-        </p:cTn>
+        <p:cTn xmlns:p14="http://schemas.microsoft.com/office/powerpoint/2010/main" id="1" dur="indefinite" restart="never" nodeType="tmRoot"/>
       </p:par>
     </p:tnLst>
   </p:timing>
 </p:sld>
 </file>
 
-<file path=ppt/slides/slide5.xml><?xml version="1.0" encoding="utf-8"?>
+<file path=ppt/slides/slide7.xml><?xml version="1.0" encoding="utf-8"?>
 <p:sld xmlns:a="http://schemas.openxmlformats.org/drawingml/2006/main" xmlns:r="http://schemas.openxmlformats.org/officeDocument/2006/relationships" xmlns:p="http://schemas.openxmlformats.org/presentationml/2006/main">
   <p:cSld>
     <p:spTree>
@@ -5793,25 +5904,23 @@
         </p:nvSpPr>
         <p:spPr>
           <a:xfrm>
-            <a:off x="822960" y="1100628"/>
-            <a:ext cx="7520940" cy="3579849"/>
+            <a:off x="508000" y="1100628"/>
+            <a:ext cx="8191500" cy="3579849"/>
           </a:xfrm>
         </p:spPr>
         <p:txBody>
-          <a:bodyPr/>
-          <a:lstStyle/>
-          <a:p>
+          <a:bodyPr>
+            <a:normAutofit/>
+          </a:bodyPr>
+          <a:lstStyle/>
+          <a:p>
+            <a:pPr>
+              <a:buFont typeface="Arial"/>
+              <a:buChar char="•"/>
+            </a:pPr>
             <a:r>
               <a:rPr lang="en-US" dirty="0" smtClean="0"/>
-              <a:t>The full </a:t>
-            </a:r>
-            <a:r>
-              <a:rPr lang="en-US" dirty="0" smtClean="0"/>
-              <a:t>version of the application </a:t>
-            </a:r>
-            <a:r>
-              <a:rPr lang="en-US" dirty="0" smtClean="0"/>
-              <a:t>will utilize the included </a:t>
+              <a:t>The full version of the application will utilize the included </a:t>
             </a:r>
             <a:r>
               <a:rPr lang="en-US" dirty="0" err="1" smtClean="0"/>
@@ -5819,15 +5928,67 @@
             </a:r>
             <a:r>
               <a:rPr lang="en-US" dirty="0" smtClean="0"/>
-              <a:t> </a:t>
+              <a:t> default user interfaces. The application will include core exercises, along with upper and lower body </a:t>
             </a:r>
             <a:r>
               <a:rPr lang="en-US" dirty="0" smtClean="0"/>
-              <a:t>default </a:t>
+              <a:t>workouts</a:t>
             </a:r>
             <a:r>
               <a:rPr lang="en-US" dirty="0" smtClean="0"/>
-              <a:t>user interfaces. The application will include core exercises, along with upper and lower body to workouts. The tips section will tell users stretches and what to bring when exercising.</a:t>
+              <a:t>. </a:t>
+            </a:r>
+            <a:r>
+              <a:rPr lang="en-US" dirty="0" smtClean="0"/>
+              <a:t>There will be a tips </a:t>
+            </a:r>
+            <a:r>
+              <a:rPr lang="en-US" dirty="0" smtClean="0"/>
+              <a:t>section </a:t>
+            </a:r>
+            <a:r>
+              <a:rPr lang="en-US" dirty="0" smtClean="0"/>
+              <a:t>that provides </a:t>
+            </a:r>
+            <a:r>
+              <a:rPr lang="en-US" dirty="0" smtClean="0"/>
+              <a:t>users with stretches </a:t>
+            </a:r>
+            <a:r>
+              <a:rPr lang="en-US" dirty="0" smtClean="0"/>
+              <a:t>and </a:t>
+            </a:r>
+            <a:r>
+              <a:rPr lang="en-US" dirty="0" smtClean="0"/>
+              <a:t>recommended items to </a:t>
+            </a:r>
+            <a:r>
+              <a:rPr lang="en-US" dirty="0" smtClean="0"/>
+              <a:t>bring </a:t>
+            </a:r>
+            <a:r>
+              <a:rPr lang="en-US" dirty="0" smtClean="0"/>
+              <a:t>with them when </a:t>
+            </a:r>
+            <a:r>
+              <a:rPr lang="en-US" dirty="0" smtClean="0"/>
+              <a:t>exercising</a:t>
+            </a:r>
+            <a:r>
+              <a:rPr lang="en-US" dirty="0" smtClean="0"/>
+              <a:t>. There will also be an integrated progress tracker, which will take information recorded in the workout queue and graph it in several different types of charts. This will include a graphic view of the entire human body from multiple angles (accessible via a tab interface along the bottom of the screen). This diagram will include highlighted muscle groups with colors assigned based on the frequency with which the user </a:t>
+            </a:r>
+            <a:r>
+              <a:rPr lang="en-US" dirty="0"/>
+              <a:t>has logged (acquired through the workout queue) </a:t>
+            </a:r>
+            <a:r>
+              <a:rPr lang="en-US" dirty="0" smtClean="0"/>
+              <a:t>exercising those specific muscle groups. The workout queue will contain added features to display the pertinent data entered in the workout in a label alongside the item in the table view so the user will not need to acces</a:t>
+            </a:r>
+            <a:r>
+              <a:rPr lang="en-US" dirty="0" smtClean="0"/>
+              <a:t>s the view in order to check their previously entered information. Previously entered information in the aforementioned view will be stored in a scrollable table so that the user can view stored data logs.</a:t>
             </a:r>
             <a:endParaRPr lang="en-US" dirty="0"/>
           </a:p>
@@ -5849,7 +6010,7 @@
         </p:blipFill>
         <p:spPr>
           <a:xfrm>
-            <a:off x="2883724" y="3041431"/>
+            <a:off x="4058474" y="4438431"/>
             <a:ext cx="2876579" cy="2302902"/>
           </a:xfrm>
           <a:prstGeom prst="rect">
@@ -5869,8 +6030,8 @@
   </p:clrMapOvr>
   <mc:AlternateContent xmlns:mc="http://schemas.openxmlformats.org/markup-compatibility/2006">
     <mc:Choice xmlns:p14="http://schemas.microsoft.com/office/powerpoint/2010/main" Requires="p14">
-      <p:transition spd="slow" p14:dur="2000">
-        <p14:ferris dir="l"/>
+      <p:transition spd="slow" p14:dur="1600">
+        <p14:prism isContent="1" isInverted="1"/>
       </p:transition>
     </mc:Choice>
     <mc:Fallback>

</xml_diff>

<commit_message>
Revert "I changed mo stuff"
This reverts commit c456604b49bcca18dad68bbbdb7ae0e2762708f2.
</commit_message>
<xml_diff>
--- a/PrototypeDemoCurtis314.pptx
+++ b/PrototypeDemoCurtis314.pptx
@@ -7,11 +7,9 @@
   <p:sldIdLst>
     <p:sldId id="256" r:id="rId2"/>
     <p:sldId id="257" r:id="rId3"/>
-    <p:sldId id="262" r:id="rId4"/>
-    <p:sldId id="263" r:id="rId5"/>
-    <p:sldId id="258" r:id="rId6"/>
-    <p:sldId id="259" r:id="rId7"/>
-    <p:sldId id="260" r:id="rId8"/>
+    <p:sldId id="258" r:id="rId4"/>
+    <p:sldId id="259" r:id="rId5"/>
+    <p:sldId id="260" r:id="rId6"/>
   </p:sldIdLst>
   <p:sldSz cx="9144000" cy="6858000" type="screen4x3"/>
   <p:notesSz cx="6858000" cy="9144000"/>
@@ -4807,39 +4805,34 @@
           <a:p>
             <a:r>
               <a:rPr lang="en-US" dirty="0" smtClean="0"/>
-              <a:t>Group # 05</a:t>
-            </a:r>
-            <a:r>
-              <a:rPr lang="en-US" dirty="0" smtClean="0"/>
-              <a:t/>
+              <a:t>Team Number 5</a:t>
             </a:r>
             <a:br>
               <a:rPr lang="en-US" dirty="0" smtClean="0"/>
             </a:br>
             <a:r>
               <a:rPr lang="en-US" dirty="0" smtClean="0"/>
-              <a:t>Team </a:t>
-            </a:r>
-            <a:r>
-              <a:rPr lang="en-US" dirty="0" smtClean="0"/>
-              <a:t>America</a:t>
-            </a:r>
-            <a:r>
-              <a:rPr lang="en-US" dirty="0" smtClean="0"/>
-              <a:t/>
+              <a:t>Team America</a:t>
             </a:r>
             <a:br>
               <a:rPr lang="en-US" dirty="0" smtClean="0"/>
             </a:br>
             <a:r>
               <a:rPr lang="en-US" dirty="0" smtClean="0"/>
-              <a:t>Workout Central</a:t>
+              <a:t>(alt. name): Team America</a:t>
             </a:r>
             <a:br>
               <a:rPr lang="en-US" dirty="0" smtClean="0"/>
             </a:br>
             <a:r>
               <a:rPr lang="en-US" dirty="0" smtClean="0"/>
+              <a:t>Workout Central</a:t>
+            </a:r>
+            <a:br>
+              <a:rPr lang="en-US" dirty="0" smtClean="0"/>
+            </a:br>
+            <a:r>
+              <a:rPr lang="en-US" dirty="0" smtClean="0"/>
               <a:t>Ryan Lin, Bryan Herrera, Seth Furman, Daniel </a:t>
             </a:r>
             <a:r>
@@ -4865,18 +4858,6 @@
           <a:bodyPr/>
           <a:lstStyle/>
           <a:p>
-            <a:r>
-              <a:rPr lang="en-US" dirty="0" smtClean="0"/>
-              <a:t>Mobile App Development (</a:t>
-            </a:r>
-            <a:r>
-              <a:rPr lang="en-US" dirty="0" err="1" smtClean="0"/>
-              <a:t>iOS</a:t>
-            </a:r>
-            <a:r>
-              <a:rPr lang="en-US" dirty="0" smtClean="0"/>
-              <a:t>)</a:t>
-            </a:r>
             <a:endParaRPr lang="en-US" dirty="0"/>
           </a:p>
         </p:txBody>
@@ -4929,7 +4910,70 @@
   <p:timing>
     <p:tnLst>
       <p:par>
-        <p:cTn xmlns:p14="http://schemas.microsoft.com/office/powerpoint/2010/main" id="1" dur="indefinite" restart="never" nodeType="tmRoot"/>
+        <p:cTn xmlns:p14="http://schemas.microsoft.com/office/powerpoint/2010/main" id="1" dur="indefinite" restart="never" nodeType="tmRoot">
+          <p:childTnLst>
+            <p:seq concurrent="1" nextAc="seek">
+              <p:cTn id="2" dur="indefinite" nodeType="mainSeq">
+                <p:childTnLst>
+                  <p:par>
+                    <p:cTn id="3" fill="hold">
+                      <p:stCondLst>
+                        <p:cond delay="indefinite"/>
+                      </p:stCondLst>
+                      <p:childTnLst>
+                        <p:par>
+                          <p:cTn id="4" fill="hold">
+                            <p:stCondLst>
+                              <p:cond delay="0"/>
+                            </p:stCondLst>
+                            <p:childTnLst>
+                              <p:par>
+                                <p:cTn id="5" presetID="0" presetClass="path" presetSubtype="0" accel="50000" decel="50000" fill="hold" nodeType="clickEffect">
+                                  <p:stCondLst>
+                                    <p:cond delay="0"/>
+                                  </p:stCondLst>
+                                  <p:childTnLst>
+                                    <p:animMotion origin="layout" path="M 0.00139 -0.00185 L 0.65776 -0.69165 " pathEditMode="relative" rAng="0" ptsTypes="AA">
+                                      <p:cBhvr>
+                                        <p:cTn id="6" dur="5000" fill="hold"/>
+                                        <p:tgtEl>
+                                          <p:spTgt spid="4"/>
+                                        </p:tgtEl>
+                                        <p:attrNameLst>
+                                          <p:attrName>ppt_x</p:attrName>
+                                          <p:attrName>ppt_y</p:attrName>
+                                        </p:attrNameLst>
+                                      </p:cBhvr>
+                                      <p:rCtr x="32818" y="-34490"/>
+                                    </p:animMotion>
+                                  </p:childTnLst>
+                                </p:cTn>
+                              </p:par>
+                            </p:childTnLst>
+                          </p:cTn>
+                        </p:par>
+                      </p:childTnLst>
+                    </p:cTn>
+                  </p:par>
+                </p:childTnLst>
+              </p:cTn>
+              <p:prevCondLst>
+                <p:cond evt="onPrev" delay="0">
+                  <p:tgtEl>
+                    <p:sldTgt/>
+                  </p:tgtEl>
+                </p:cond>
+              </p:prevCondLst>
+              <p:nextCondLst>
+                <p:cond evt="onNext" delay="0">
+                  <p:tgtEl>
+                    <p:sldTgt/>
+                  </p:tgtEl>
+                </p:cond>
+              </p:nextCondLst>
+            </p:seq>
+          </p:childTnLst>
+        </p:cTn>
       </p:par>
     </p:tnLst>
   </p:timing>
@@ -4988,110 +5032,22 @@
         </p:nvSpPr>
         <p:spPr/>
         <p:txBody>
-          <a:bodyPr>
-            <a:normAutofit/>
-          </a:bodyPr>
+          <a:bodyPr/>
           <a:lstStyle/>
           <a:p>
-            <a:pPr>
-              <a:buFont typeface="Arial"/>
-              <a:buChar char="•"/>
-            </a:pPr>
-            <a:r>
-              <a:rPr lang="en-US" sz="1800" dirty="0" smtClean="0"/>
-              <a:t>Our intention is to create </a:t>
-            </a:r>
-            <a:r>
-              <a:rPr lang="en-US" sz="1800" dirty="0" smtClean="0"/>
-              <a:t>an application </a:t>
-            </a:r>
-            <a:r>
-              <a:rPr lang="en-US" sz="1800" dirty="0" smtClean="0"/>
-              <a:t>that</a:t>
-            </a:r>
-            <a:r>
-              <a:rPr lang="en-US" sz="1800" dirty="0" smtClean="0"/>
-              <a:t> helps </a:t>
-            </a:r>
-            <a:r>
-              <a:rPr lang="en-US" sz="1800" dirty="0" smtClean="0"/>
-              <a:t>users learn how to exercise </a:t>
-            </a:r>
-            <a:r>
-              <a:rPr lang="en-US" sz="1800" dirty="0" smtClean="0"/>
-              <a:t>efficiently, and provides them with a simple mechanism to track their fitness.</a:t>
-            </a:r>
-          </a:p>
-          <a:p>
-            <a:pPr>
-              <a:buFont typeface="Arial"/>
-              <a:buChar char="•"/>
-            </a:pPr>
-            <a:r>
-              <a:rPr lang="en-US" sz="1800" dirty="0" smtClean="0"/>
-              <a:t>The </a:t>
-            </a:r>
-            <a:r>
-              <a:rPr lang="en-US" sz="1800" dirty="0" smtClean="0"/>
-              <a:t>application may also provide users with information to workouts that they have never heard of </a:t>
-            </a:r>
-            <a:r>
-              <a:rPr lang="en-US" sz="1800" dirty="0" smtClean="0"/>
-              <a:t>before, and hopefully will inspire users to increase their physical activity. (A current proble</a:t>
-            </a:r>
-            <a:r>
-              <a:rPr lang="en-US" sz="1800" dirty="0" smtClean="0"/>
-              <a:t>m in the US and Worldwide</a:t>
-            </a:r>
-            <a:r>
-              <a:rPr lang="en-US" sz="1800" dirty="0" smtClean="0"/>
-              <a:t>)</a:t>
-            </a:r>
-          </a:p>
-          <a:p>
-            <a:pPr>
-              <a:buFont typeface="Arial"/>
-              <a:buChar char="•"/>
-            </a:pPr>
-            <a:r>
-              <a:rPr lang="en-US" sz="1800" dirty="0" smtClean="0"/>
-              <a:t>Images will show </a:t>
-            </a:r>
-            <a:r>
-              <a:rPr lang="en-US" sz="1800" dirty="0" smtClean="0"/>
-              <a:t>users how to do each </a:t>
-            </a:r>
-            <a:r>
-              <a:rPr lang="en-US" sz="1800" dirty="0" smtClean="0"/>
-              <a:t>exercise, and will be accompanied by written instructions.</a:t>
-            </a:r>
-          </a:p>
-          <a:p>
-            <a:pPr>
-              <a:buFont typeface="Arial"/>
-              <a:buChar char="•"/>
-            </a:pPr>
-            <a:r>
-              <a:rPr lang="en-US" sz="1800" dirty="0" smtClean="0"/>
-              <a:t>Our </a:t>
-            </a:r>
-            <a:r>
-              <a:rPr lang="en-US" sz="1800" dirty="0" smtClean="0"/>
-              <a:t>application is unique because </a:t>
-            </a:r>
-            <a:r>
-              <a:rPr lang="en-US" sz="1800" dirty="0" smtClean="0"/>
-              <a:t>it will provide an extremely simple user interface for the casual </a:t>
-            </a:r>
-            <a:r>
-              <a:rPr lang="en-US" sz="1800" dirty="0"/>
-              <a:t>iPhone </a:t>
-            </a:r>
-            <a:r>
-              <a:rPr lang="en-US" sz="1800" dirty="0" smtClean="0"/>
-              <a:t>user.</a:t>
-            </a:r>
-            <a:endParaRPr lang="en-US" sz="1800" dirty="0"/>
+            <a:r>
+              <a:rPr lang="en-US" dirty="0" smtClean="0"/>
+              <a:t>Create an application to help users learn how to exercise </a:t>
+            </a:r>
+            <a:r>
+              <a:rPr lang="en-US" dirty="0" smtClean="0"/>
+              <a:t>efficiently. The application may also provide </a:t>
+            </a:r>
+            <a:r>
+              <a:rPr lang="en-US" dirty="0" smtClean="0"/>
+              <a:t>users with information to workouts that they have never heard of before. Images can show users how to do each exercise. In order to increase the simplicity and ease of use for the application, only buttons and titles will be in the menu and submenus. Our application is unique because users can access it anywhere. </a:t>
+            </a:r>
+            <a:endParaRPr lang="en-US" dirty="0"/>
           </a:p>
         </p:txBody>
       </p:sp>
@@ -5137,8 +5093,8 @@
         </p:blipFill>
         <p:spPr>
           <a:xfrm>
-            <a:off x="5703246" y="4160991"/>
-            <a:ext cx="2379230" cy="2310267"/>
+            <a:off x="6158007" y="3795582"/>
+            <a:ext cx="2617153" cy="2541294"/>
           </a:xfrm>
           <a:prstGeom prst="rect">
             <a:avLst/>
@@ -5155,13 +5111,13 @@
   <p:clrMapOvr>
     <a:masterClrMapping/>
   </p:clrMapOvr>
-  <mc:AlternateContent xmlns:mc="http://schemas.openxmlformats.org/markup-compatibility/2006" xmlns:p14="http://schemas.microsoft.com/office/powerpoint/2010/main">
-    <mc:Choice Requires="p14">
+  <mc:AlternateContent xmlns:mc="http://schemas.openxmlformats.org/markup-compatibility/2006">
+    <mc:Choice xmlns:p14="http://schemas.microsoft.com/office/powerpoint/2010/main" Requires="p14">
       <p:transition spd="slow">
         <p14:flash/>
       </p:transition>
     </mc:Choice>
-    <mc:Fallback xmlns="">
+    <mc:Fallback>
       <p:transition xmlns:p14="http://schemas.microsoft.com/office/powerpoint/2010/main" spd="slow">
         <p:fade/>
       </p:transition>
@@ -5194,113 +5150,199 @@
           <a:chExt cx="0" cy="0"/>
         </a:xfrm>
       </p:grpSpPr>
-      <p:sp>
-        <p:nvSpPr>
-          <p:cNvPr id="2" name="Title 1"/>
-          <p:cNvSpPr>
-            <a:spLocks noGrp="1"/>
-          </p:cNvSpPr>
-          <p:nvPr>
-            <p:ph type="title"/>
-          </p:nvPr>
-        </p:nvSpPr>
-        <p:spPr/>
-        <p:txBody>
-          <a:bodyPr/>
-          <a:lstStyle/>
-          <a:p>
-            <a:r>
-              <a:rPr lang="en-US" dirty="0" smtClean="0"/>
-              <a:t>Troubles We have had</a:t>
-            </a:r>
-            <a:endParaRPr lang="en-US" dirty="0"/>
-          </a:p>
-        </p:txBody>
-      </p:sp>
-      <p:sp>
-        <p:nvSpPr>
-          <p:cNvPr id="3" name="Content Placeholder 2"/>
-          <p:cNvSpPr>
-            <a:spLocks noGrp="1"/>
-          </p:cNvSpPr>
-          <p:nvPr>
-            <p:ph idx="1"/>
-          </p:nvPr>
-        </p:nvSpPr>
-        <p:spPr/>
-        <p:txBody>
-          <a:bodyPr>
-            <a:normAutofit/>
-          </a:bodyPr>
-          <a:lstStyle/>
-          <a:p>
-            <a:pPr marL="285750" indent="-285750">
-              <a:buFont typeface="Arial"/>
-              <a:buChar char="•"/>
-            </a:pPr>
-            <a:r>
-              <a:rPr lang="en-US" sz="2000" dirty="0" smtClean="0"/>
-              <a:t>ERRORS: We’ve encountered numerous errors within the </a:t>
-            </a:r>
-            <a:r>
-              <a:rPr lang="en-US" sz="2000" dirty="0" err="1" smtClean="0"/>
-              <a:t>Xcode</a:t>
-            </a:r>
-            <a:r>
-              <a:rPr lang="en-US" sz="2000" dirty="0" smtClean="0"/>
-              <a:t> environment ranging from forgetting a single semicolon ‘;’ to misusing entire methods (aka functions) and concepts. The majority of the builds that we have created have failed in one way or another on multiple occasions due to these errors, which depending on the importance and complexity may be very difficult and frustrating to resolve.</a:t>
-            </a:r>
-            <a:endParaRPr lang="en-US" sz="2000" dirty="0"/>
-          </a:p>
-        </p:txBody>
-      </p:sp>
       <p:pic>
         <p:nvPicPr>
-          <p:cNvPr id="6" name="Picture 5" descr="seo_errorsfound.png"/>
+          <p:cNvPr id="4" name="Content Placeholder 3"/>
           <p:cNvPicPr>
-            <a:picLocks noChangeAspect="1"/>
+            <a:picLocks noGrp="1" noChangeAspect="1"/>
           </p:cNvPicPr>
-          <p:nvPr/>
+          <p:nvPr>
+            <p:ph idx="1"/>
+          </p:nvPr>
         </p:nvPicPr>
         <p:blipFill>
-          <a:blip r:embed="rId2">
-            <a:extLst>
-              <a:ext uri="{28A0092B-C50C-407E-A947-70E740481C1C}">
-                <a14:useLocalDpi xmlns:a14="http://schemas.microsoft.com/office/drawing/2010/main" val="0"/>
-              </a:ext>
-            </a:extLst>
-          </a:blip>
+          <a:blip r:embed="rId2"/>
+          <a:srcRect l="-46685" r="-46685"/>
           <a:stretch>
             <a:fillRect/>
           </a:stretch>
         </p:blipFill>
         <p:spPr>
+          <a:xfrm rot="189903">
+            <a:off x="8615658" y="1186851"/>
+            <a:ext cx="4041193" cy="3304730"/>
+          </a:xfrm>
+        </p:spPr>
+      </p:pic>
+      <p:sp>
+        <p:nvSpPr>
+          <p:cNvPr id="2" name="Title 1"/>
+          <p:cNvSpPr>
+            <a:spLocks noGrp="1"/>
+          </p:cNvSpPr>
+          <p:nvPr>
+            <p:ph type="title"/>
+          </p:nvPr>
+        </p:nvSpPr>
+        <p:spPr>
           <a:xfrm>
-            <a:off x="5739560" y="3564685"/>
-            <a:ext cx="2728637" cy="2728637"/>
+            <a:off x="822960" y="365760"/>
+            <a:ext cx="7520940" cy="548640"/>
+          </a:xfrm>
+        </p:spPr>
+        <p:txBody>
+          <a:bodyPr/>
+          <a:lstStyle/>
+          <a:p>
+            <a:r>
+              <a:rPr lang="en-US" dirty="0" smtClean="0"/>
+              <a:t>Done So Far</a:t>
+            </a:r>
+            <a:endParaRPr lang="en-US" dirty="0"/>
+          </a:p>
+        </p:txBody>
+      </p:sp>
+      <p:sp>
+        <p:nvSpPr>
+          <p:cNvPr id="12" name="TextBox 11"/>
+          <p:cNvSpPr txBox="1"/>
+          <p:nvPr/>
+        </p:nvSpPr>
+        <p:spPr>
+          <a:xfrm>
+            <a:off x="166779" y="1321252"/>
+            <a:ext cx="6712645" cy="1200329"/>
           </a:xfrm>
           <a:prstGeom prst="rect">
             <a:avLst/>
           </a:prstGeom>
+          <a:noFill/>
         </p:spPr>
-      </p:pic>
+        <p:txBody>
+          <a:bodyPr wrap="none" rtlCol="0">
+            <a:spAutoFit/>
+          </a:bodyPr>
+          <a:lstStyle/>
+          <a:p>
+            <a:r>
+              <a:rPr lang="en-US" dirty="0" smtClean="0"/>
+              <a:t>So far we have completed a menu and submenu for the exercises.</a:t>
+            </a:r>
+          </a:p>
+          <a:p>
+            <a:r>
+              <a:rPr lang="en-US" dirty="0" smtClean="0"/>
+              <a:t>Also, we categorized each exercise to the body parts they are</a:t>
+            </a:r>
+          </a:p>
+          <a:p>
+            <a:r>
+              <a:rPr lang="en-US" dirty="0"/>
+              <a:t>s</a:t>
+            </a:r>
+            <a:r>
+              <a:rPr lang="en-US" dirty="0" smtClean="0"/>
+              <a:t>pecific for such as upper body, legs, and core.</a:t>
+            </a:r>
+          </a:p>
+          <a:p>
+            <a:r>
+              <a:rPr lang="en-US" dirty="0" smtClean="0"/>
+              <a:t>  </a:t>
+            </a:r>
+            <a:endParaRPr lang="en-US" dirty="0"/>
+          </a:p>
+        </p:txBody>
+      </p:sp>
     </p:spTree>
     <p:extLst>
       <p:ext uri="{BB962C8B-B14F-4D97-AF65-F5344CB8AC3E}">
-        <p14:creationId xmlns:p14="http://schemas.microsoft.com/office/powerpoint/2010/main" val="1826742938"/>
+        <p14:creationId xmlns:p14="http://schemas.microsoft.com/office/powerpoint/2010/main" val="605547221"/>
       </p:ext>
     </p:extLst>
   </p:cSld>
   <p:clrMapOvr>
     <a:masterClrMapping/>
   </p:clrMapOvr>
-  <p:transition xmlns:p14="http://schemas.microsoft.com/office/powerpoint/2010/main" spd="slow">
-    <p:push dir="u"/>
-  </p:transition>
+  <mc:AlternateContent xmlns:mc="http://schemas.openxmlformats.org/markup-compatibility/2006">
+    <mc:Choice xmlns:p14="http://schemas.microsoft.com/office/powerpoint/2010/main" Requires="p14">
+      <p:transition spd="slow" p14:dur="2000">
+        <p14:honeycomb/>
+      </p:transition>
+    </mc:Choice>
+    <mc:Fallback>
+      <p:transition xmlns:p14="http://schemas.microsoft.com/office/powerpoint/2010/main" spd="slow">
+        <p:fade/>
+      </p:transition>
+    </mc:Fallback>
+  </mc:AlternateContent>
   <p:timing>
     <p:tnLst>
       <p:par>
-        <p:cTn xmlns:p14="http://schemas.microsoft.com/office/powerpoint/2010/main" id="1" dur="indefinite" restart="never" nodeType="tmRoot"/>
+        <p:cTn xmlns:p14="http://schemas.microsoft.com/office/powerpoint/2010/main" id="1" dur="indefinite" restart="never" nodeType="tmRoot">
+          <p:childTnLst>
+            <p:seq concurrent="1" nextAc="seek">
+              <p:cTn id="2" dur="indefinite" nodeType="mainSeq">
+                <p:childTnLst>
+                  <p:par>
+                    <p:cTn id="3" fill="hold">
+                      <p:stCondLst>
+                        <p:cond delay="indefinite"/>
+                      </p:stCondLst>
+                      <p:childTnLst>
+                        <p:par>
+                          <p:cTn id="4" fill="hold">
+                            <p:stCondLst>
+                              <p:cond delay="0"/>
+                            </p:stCondLst>
+                            <p:childTnLst>
+                              <p:par>
+                                <p:cTn id="5" presetID="0" presetClass="path" presetSubtype="0" accel="50000" decel="50000" fill="hold" nodeType="clickEffect">
+                                  <p:stCondLst>
+                                    <p:cond delay="0"/>
+                                  </p:stCondLst>
+                                  <p:childTnLst>
+                                    <p:animMotion origin="layout" path="M -0.04186 0.01158 C -0.04377 0.01204 -0.04585 0.01413 -0.04759 0.01343 C -0.04932 0.01251 -0.04898 0.0081 -0.05054 0.00764 C -0.05349 0.00648 -0.05644 0.0088 -0.05922 0.00949 C -0.07242 0.01922 -0.08805 0.02386 -0.09969 0.0366 C -0.12748 0.06601 -0.10455 0.04216 -0.14901 0.08478 C -0.1544 0.08964 -0.15891 0.09682 -0.16482 0.1003 C -0.17593 0.10632 -0.18705 0.11026 -0.19816 0.11582 C -0.20216 0.09914 -0.19677 0.08269 -0.19243 0.0674 C -0.19191 0.06231 -0.19069 0.05721 -0.19087 0.05212 C -0.19121 0.0491 -0.19173 0.04424 -0.19382 0.04424 C -0.19608 0.04424 -0.19556 0.04957 -0.19677 0.05212 C -0.20094 0.0593 -0.20615 0.06555 -0.2098 0.0732 C -0.21171 0.0769 -0.21362 0.08084 -0.21553 0.08478 C -0.21657 0.08617 -0.2296 0.10979 -0.23289 0.11373 C -0.23446 0.11512 -0.24193 0.11698 -0.24297 0.11767 C -0.25721 0.12416 -0.25408 0.12184 -0.2619 0.12925 C -0.26728 0.11837 -0.26398 0.12068 -0.2777 0.13319 C -0.28673 0.14107 -0.29507 0.14987 -0.30375 0.15821 C -0.30601 0.16029 -0.3074 0.164 -0.30966 0.16585 C -0.31574 0.17002 -0.32234 0.17164 -0.32841 0.17558 C -0.34161 0.18346 -0.35412 0.19133 -0.36749 0.19875 C -0.37669 0.19481 -0.37044 0.18207 -0.36749 0.17373 C -0.36662 0.17095 -0.36367 0.1684 -0.36454 0.16585 C -0.36541 0.16354 -0.36749 0.16863 -0.36888 0.16979 C -0.37774 0.17628 -0.38798 0.18971 -0.39788 0.19295 C -0.41838 0.19921 -0.43956 0.19875 -0.46006 0.20639 C -0.45537 0.1999 -0.45398 0.19736 -0.44703 0.19295 C -0.44582 0.19203 -0.44894 0.19573 -0.44998 0.19689 C -0.45398 0.1999 -0.4578 0.20338 -0.46162 0.20639 C -0.46891 0.21172 -0.47621 0.21658 -0.48333 0.22191 C -0.48593 0.22353 -0.49045 0.2277 -0.49045 0.22793 C -0.4875 0.21936 -0.48368 0.21334 -0.48177 0.20454 C -0.49983 0.19481 -0.53144 0.21635 -0.54411 0.23349 C -0.54967 0.24809 -0.56027 0.24716 -0.5686 0.25851 C -0.56808 0.25388 -0.56739 0.24762 -0.56582 0.24322 C -0.56461 0.23905 -0.55836 0.2321 -0.56148 0.23164 C -0.57138 0.23002 -0.58076 0.23627 -0.59031 0.23928 C -0.60542 0.24368 -0.61897 0.25226 -0.63373 0.25666 C -0.63998 0.25828 -0.64641 0.25897 -0.65266 0.26059 C -0.65665 0.26152 -0.6603 0.26291 -0.66412 0.2643 C -0.66377 0.26222 -0.66134 0.25805 -0.66273 0.25851 C -0.68184 0.26384 -0.70216 0.27611 -0.72056 0.28561 C -0.73619 0.28144 -0.75252 0.28538 -0.76832 0.28376 C -0.76937 0.27913 -0.76815 0.27171 -0.77128 0.27009 C -0.77388 0.2687 -0.78534 0.2738 -0.79003 0.27588 C -0.7916 0.27774 -0.79281 0.28005 -0.79437 0.28167 C -0.79576 0.2826 -0.7982 0.28561 -0.79872 0.28376 C -0.79958 0.28098 -0.79698 0.27843 -0.79594 0.27588 C -0.79698 0.27333 -0.79681 0.2694 -0.79872 0.26824 C -0.81417 0.25897 -0.83536 0.26986 -0.85082 0.27403 C -0.87027 0.29094 -0.84769 0.27287 -0.87114 0.28561 C -0.90222 0.30206 -0.87861 0.29395 -0.89424 0.29905 C -0.90813 0.28492 -0.92567 0.28885 -0.942 0.28376 C -0.95867 0.29465 -0.96561 0.30206 -0.942 0.27218 C -0.92567 0.2511 -0.9083 0.23048 -0.89128 0.21033 C -0.89041 0.20708 -0.88642 0.20245 -0.8885 0.2006 C -0.89094 0.19828 -0.90101 0.21357 -0.90153 0.21427 C -0.90726 0.21983 -0.91664 0.22145 -0.92324 0.22376 C -0.94026 0.23535 -0.9446 0.23349 -0.96666 0.23535 C -0.99132 0.25202 -1.02588 0.25226 -1.05054 0.25666 C -1.09205 0.26361 -1.07329 0.25897 -1.10837 0.27009 C -1.11445 0.27542 -1.1273 0.28376 -1.1273 0.28399 C -1.12887 0.28237 -1.12991 0.28005 -1.13164 0.27982 C -1.13512 0.27913 -1.13876 0.28353 -1.14172 0.28167 C -1.14363 0.28028 -1.14102 0.27635 -1.14033 0.27403 C -1.13859 0.26476 -1.13616 0.25596 -1.13442 0.24693 C -1.13408 0.24438 -1.13112 0.23951 -1.13303 0.23928 C -1.1372 0.23836 -1.14102 0.24253 -1.14467 0.24507 C -1.14832 0.24716 -1.15162 0.24994 -1.15474 0.25272 C -1.15683 0.25434 -1.15856 0.25642 -1.16047 0.25851 C -1.17819 0.24948 -1.1768 0.26314 -1.1966 0.26639 C -1.21709 0.26963 -1.2223 0.27218 -1.24592 0.27218 " pathEditMode="relative" rAng="0" ptsTypes="ffffffffffffffffffffffffffffffffffffffffffffffffffffffffffffffffffffffffA">
+                                      <p:cBhvr>
+                                        <p:cTn id="6" dur="2000" fill="hold"/>
+                                        <p:tgtEl>
+                                          <p:spTgt spid="4"/>
+                                        </p:tgtEl>
+                                        <p:attrNameLst>
+                                          <p:attrName>ppt_x</p:attrName>
+                                          <p:attrName>ppt_y</p:attrName>
+                                        </p:attrNameLst>
+                                      </p:cBhvr>
+                                      <p:rCtr x="-60212" y="14269"/>
+                                    </p:animMotion>
+                                  </p:childTnLst>
+                                </p:cTn>
+                              </p:par>
+                            </p:childTnLst>
+                          </p:cTn>
+                        </p:par>
+                      </p:childTnLst>
+                    </p:cTn>
+                  </p:par>
+                </p:childTnLst>
+              </p:cTn>
+              <p:prevCondLst>
+                <p:cond evt="onPrev" delay="0">
+                  <p:tgtEl>
+                    <p:sldTgt/>
+                  </p:tgtEl>
+                </p:cond>
+              </p:prevCondLst>
+              <p:nextCondLst>
+                <p:cond evt="onNext" delay="0">
+                  <p:tgtEl>
+                    <p:sldTgt/>
+                  </p:tgtEl>
+                </p:cond>
+              </p:nextCondLst>
+            </p:seq>
+          </p:childTnLst>
+        </p:cTn>
       </p:par>
     </p:tnLst>
   </p:timing>
@@ -5341,7 +5383,7 @@
           <a:p>
             <a:r>
               <a:rPr lang="en-US" dirty="0" smtClean="0"/>
-              <a:t>Successes We’ve had</a:t>
+              <a:t>Expect Done By End</a:t>
             </a:r>
             <a:endParaRPr lang="en-US" dirty="0"/>
           </a:p>
@@ -5362,39 +5404,13 @@
           <a:bodyPr/>
           <a:lstStyle/>
           <a:p>
-            <a:pPr>
-              <a:buFont typeface="Arial"/>
-              <a:buChar char="•"/>
-            </a:pPr>
+            <a:r>
+              <a:rPr lang="en-US" dirty="0"/>
+              <a:t>	The fully released application will have text segments to guide users through respective workouts. The application will not include video segments or graphs to assist users. However, the text-based documents will feature a variety of images to clarify how to complete individual </a:t>
+            </a:r>
             <a:r>
               <a:rPr lang="en-US" dirty="0" smtClean="0"/>
-              <a:t>In spite of our troubles with </a:t>
-            </a:r>
-            <a:r>
-              <a:rPr lang="en-US" dirty="0" err="1" smtClean="0"/>
-              <a:t>Xcode</a:t>
-            </a:r>
-            <a:r>
-              <a:rPr lang="en-US" dirty="0" smtClean="0"/>
-              <a:t> we’ve been able to create a foundation for the basis of our App. </a:t>
-            </a:r>
-          </a:p>
-          <a:p>
-            <a:pPr>
-              <a:buFont typeface="Arial"/>
-              <a:buChar char="•"/>
-            </a:pPr>
-            <a:r>
-              <a:rPr lang="en-US" dirty="0" smtClean="0"/>
-              <a:t>The Learning Curve: Using </a:t>
-            </a:r>
-            <a:r>
-              <a:rPr lang="en-US" dirty="0" err="1" smtClean="0"/>
-              <a:t>Xcode</a:t>
-            </a:r>
-            <a:r>
-              <a:rPr lang="en-US" dirty="0" smtClean="0"/>
-              <a:t> and Objective C was very challenging at the beginning. However, we have begun to progress beyond the initial and painfully slow stages of the learning curve. We are currently making slow, but steady progress in our application, and our confidence level has risen to a reasonable degree.</a:t>
+              <a:t>exercise activities.</a:t>
             </a:r>
             <a:endParaRPr lang="en-US" dirty="0"/>
           </a:p>
@@ -5402,28 +5418,70 @@
       </p:sp>
       <p:pic>
         <p:nvPicPr>
-          <p:cNvPr id="6" name="Picture 5" descr="fig5a.png"/>
+          <p:cNvPr id="4" name="Picture 3"/>
           <p:cNvPicPr>
             <a:picLocks noChangeAspect="1"/>
           </p:cNvPicPr>
           <p:nvPr/>
         </p:nvPicPr>
         <p:blipFill>
-          <a:blip r:embed="rId2">
-            <a:extLst>
-              <a:ext uri="{28A0092B-C50C-407E-A947-70E740481C1C}">
-                <a14:useLocalDpi xmlns:a14="http://schemas.microsoft.com/office/drawing/2010/main" val="0"/>
-              </a:ext>
-            </a:extLst>
-          </a:blip>
+          <a:blip r:embed="rId2"/>
           <a:stretch>
             <a:fillRect/>
           </a:stretch>
         </p:blipFill>
         <p:spPr>
           <a:xfrm>
-            <a:off x="822960" y="3414294"/>
-            <a:ext cx="4470634" cy="2905912"/>
+            <a:off x="4004597" y="3835477"/>
+            <a:ext cx="1738870" cy="2612037"/>
+          </a:xfrm>
+          <a:prstGeom prst="rect">
+            <a:avLst/>
+          </a:prstGeom>
+        </p:spPr>
+      </p:pic>
+      <p:pic>
+        <p:nvPicPr>
+          <p:cNvPr id="5" name="Picture 4"/>
+          <p:cNvPicPr>
+            <a:picLocks noChangeAspect="1"/>
+          </p:cNvPicPr>
+          <p:nvPr/>
+        </p:nvPicPr>
+        <p:blipFill>
+          <a:blip r:embed="rId3"/>
+          <a:stretch>
+            <a:fillRect/>
+          </a:stretch>
+        </p:blipFill>
+        <p:spPr>
+          <a:xfrm>
+            <a:off x="7134528" y="3835477"/>
+            <a:ext cx="1621066" cy="2535070"/>
+          </a:xfrm>
+          <a:prstGeom prst="rect">
+            <a:avLst/>
+          </a:prstGeom>
+        </p:spPr>
+      </p:pic>
+      <p:pic>
+        <p:nvPicPr>
+          <p:cNvPr id="6" name="Picture 5"/>
+          <p:cNvPicPr>
+            <a:picLocks noChangeAspect="1"/>
+          </p:cNvPicPr>
+          <p:nvPr/>
+        </p:nvPicPr>
+        <p:blipFill>
+          <a:blip r:embed="rId4"/>
+          <a:stretch>
+            <a:fillRect/>
+          </a:stretch>
+        </p:blipFill>
+        <p:spPr>
+          <a:xfrm>
+            <a:off x="1119537" y="4555288"/>
+            <a:ext cx="2683168" cy="1691793"/>
           </a:xfrm>
           <a:prstGeom prst="rect">
             <a:avLst/>
@@ -5433,7 +5491,7 @@
     </p:spTree>
     <p:extLst>
       <p:ext uri="{BB962C8B-B14F-4D97-AF65-F5344CB8AC3E}">
-        <p14:creationId xmlns:p14="http://schemas.microsoft.com/office/powerpoint/2010/main" val="316046575"/>
+        <p14:creationId xmlns:p14="http://schemas.microsoft.com/office/powerpoint/2010/main" val="2171772195"/>
       </p:ext>
     </p:extLst>
   </p:cSld>
@@ -5442,20 +5500,237 @@
   </p:clrMapOvr>
   <mc:AlternateContent xmlns:mc="http://schemas.openxmlformats.org/markup-compatibility/2006">
     <mc:Choice xmlns:p14="http://schemas.microsoft.com/office/powerpoint/2010/main" Requires="p14">
-      <p:transition spd="slow" p14:dur="1600">
-        <p:blinds dir="vert"/>
+      <p:transition spd="slow" p14:dur="2000">
+        <p14:ferris dir="l"/>
       </p:transition>
     </mc:Choice>
     <mc:Fallback>
       <p:transition xmlns:p14="http://schemas.microsoft.com/office/powerpoint/2010/main" spd="slow">
-        <p:blinds dir="vert"/>
+        <p:fade/>
       </p:transition>
     </mc:Fallback>
   </mc:AlternateContent>
   <p:timing>
     <p:tnLst>
       <p:par>
-        <p:cTn xmlns:p14="http://schemas.microsoft.com/office/powerpoint/2010/main" id="1" dur="indefinite" restart="never" nodeType="tmRoot"/>
+        <p:cTn xmlns:p14="http://schemas.microsoft.com/office/powerpoint/2010/main" id="1" dur="indefinite" restart="never" nodeType="tmRoot">
+          <p:childTnLst>
+            <p:seq concurrent="1" nextAc="seek">
+              <p:cTn id="2" dur="indefinite" nodeType="mainSeq">
+                <p:childTnLst>
+                  <p:par>
+                    <p:cTn id="3" fill="hold">
+                      <p:stCondLst>
+                        <p:cond delay="indefinite"/>
+                        <p:cond evt="onBegin" delay="0">
+                          <p:tn val="2"/>
+                        </p:cond>
+                      </p:stCondLst>
+                      <p:childTnLst>
+                        <p:par>
+                          <p:cTn id="4" fill="hold">
+                            <p:stCondLst>
+                              <p:cond delay="0"/>
+                            </p:stCondLst>
+                            <p:childTnLst>
+                              <p:par>
+                                <p:cTn id="5" presetID="55" presetClass="path" presetSubtype="0" accel="50000" decel="50000" fill="hold" nodeType="afterEffect">
+                                  <p:stCondLst>
+                                    <p:cond delay="0"/>
+                                  </p:stCondLst>
+                                  <p:childTnLst>
+                                    <p:animMotion origin="layout" path="M -0.00572 0.0037 C -0.00173 -0.08558 -0.05171 -0.16285 -0.1187 -0.16817 C -0.18274 -0.17487 -0.24279 -0.11496 -0.24679 -0.02822 C -0.25164 0.05159 -0.20965 0.12631 -0.14977 0.13163 C -0.09475 0.13556 -0.04269 0.08629 -0.0387 0.0118 C -0.03471 -0.05621 -0.06976 -0.12028 -0.12079 -0.1256 C -0.16765 -0.12954 -0.21173 -0.08836 -0.21468 -0.02567 C -0.2178 0.03031 -0.18969 0.08513 -0.14769 0.08767 C -0.10968 0.09161 -0.07375 0.05968 -0.0708 0.00903 C -0.06872 -0.03631 -0.08972 -0.08026 -0.1227 -0.08304 C -0.15168 -0.08558 -0.18066 -0.06153 -0.18274 -0.0229 C -0.18465 0.01041 -0.16973 0.04234 -0.14578 0.04511 C -0.12565 0.04766 -0.10465 0.03308 -0.10378 0.00648 C -0.1017 -0.01503 -0.10968 -0.0377 -0.12478 -0.04025 C -0.13675 -0.04025 -0.14873 -0.03493 -0.15064 -0.02035 C -0.15168 -0.01087 -0.14977 -0.00162 -0.1437 0.00232 C -0.14075 0.0037 -0.13866 0.0037 -0.13571 0.00232 " pathEditMode="relative" rAng="0" ptsTypes="fffffffffffffffff">
+                                      <p:cBhvr>
+                                        <p:cTn id="6" dur="470" fill="hold"/>
+                                        <p:tgtEl>
+                                          <p:spTgt spid="4"/>
+                                        </p:tgtEl>
+                                        <p:attrNameLst>
+                                          <p:attrName>ppt_x</p:attrName>
+                                          <p:attrName>ppt_y</p:attrName>
+                                        </p:attrNameLst>
+                                      </p:cBhvr>
+                                      <p:rCtr x="-12096" y="-2336"/>
+                                    </p:animMotion>
+                                  </p:childTnLst>
+                                </p:cTn>
+                              </p:par>
+                            </p:childTnLst>
+                          </p:cTn>
+                        </p:par>
+                        <p:par>
+                          <p:cTn id="7" fill="hold">
+                            <p:stCondLst>
+                              <p:cond delay="470"/>
+                            </p:stCondLst>
+                            <p:childTnLst>
+                              <p:par>
+                                <p:cTn id="8" presetID="55" presetClass="path" presetSubtype="0" accel="50000" decel="50000" fill="hold" nodeType="afterEffect">
+                                  <p:stCondLst>
+                                    <p:cond delay="0"/>
+                                  </p:stCondLst>
+                                  <p:childTnLst>
+                                    <p:animMotion origin="layout" path="M 0 0  C 0.004 -0.0893  -0.046 -0.16661  -0.113 -0.17194  C -0.177 -0.1786  -0.237 -0.11863  -0.241 -0.03199  C -0.246 0.04798  -0.204 0.12262  -0.144 0.12796  C -0.089 0.13195  -0.037 0.08264  -0.033 0.008  C -0.029 -0.05998  -0.064 -0.12396  -0.115 -0.12929  C -0.162 -0.13329  -0.206 -0.09197  -0.209 -0.02932  C -0.212 0.02666  -0.184 0.08131  -0.142 0.08397  C -0.104 0.08797  -0.068 0.05598  -0.065 0.00533  C -0.063 -0.03999  -0.084 -0.08397  -0.117 -0.08664  C -0.146 -0.0893  -0.175 -0.06531  -0.177 -0.02666  C -0.179 0.00666  -0.164 0.03865  -0.14 0.04132  C -0.12 0.04398  -0.099 0.02932  -0.098 0.00267  C -0.096 -0.01866  -0.104 -0.04132  -0.119 -0.04398  C -0.131 -0.04398  -0.143 -0.03865  -0.145 -0.02399  C -0.146 -0.01466  -0.144 -0.00533  -0.138 -0.00133  C -0.135 0  -0.133 0  -0.13 -0.00133  E" pathEditMode="relative" ptsTypes="">
+                                      <p:cBhvr>
+                                        <p:cTn id="9" dur="340" fill="hold"/>
+                                        <p:tgtEl>
+                                          <p:spTgt spid="5"/>
+                                        </p:tgtEl>
+                                        <p:attrNameLst>
+                                          <p:attrName>ppt_x</p:attrName>
+                                          <p:attrName>ppt_y</p:attrName>
+                                        </p:attrNameLst>
+                                      </p:cBhvr>
+                                    </p:animMotion>
+                                  </p:childTnLst>
+                                </p:cTn>
+                              </p:par>
+                            </p:childTnLst>
+                          </p:cTn>
+                        </p:par>
+                        <p:par>
+                          <p:cTn id="10" fill="hold">
+                            <p:stCondLst>
+                              <p:cond delay="810"/>
+                            </p:stCondLst>
+                            <p:childTnLst>
+                              <p:par>
+                                <p:cTn id="11" presetID="55" presetClass="path" presetSubtype="0" accel="50000" decel="50000" fill="hold" nodeType="afterEffect">
+                                  <p:stCondLst>
+                                    <p:cond delay="0"/>
+                                  </p:stCondLst>
+                                  <p:childTnLst>
+                                    <p:animMotion origin="layout" path="M 0.00799 -0.01619 C 0.01198 -0.10548 -0.038 -0.18274 -0.10499 -0.18806 C -0.16903 -0.19477 -0.22908 -0.13486 -0.23307 -0.04811 C -0.23793 0.03169 -0.19594 0.10641 -0.13606 0.11173 C -0.08104 0.11566 -0.02898 0.06639 -0.02499 -0.00809 C -0.021 -0.0761 -0.05605 -0.14018 -0.10708 -0.1455 C -0.15394 -0.14943 -0.19802 -0.10825 -0.20097 -0.04557 C -0.20409 0.01041 -0.17598 0.06524 -0.13398 0.06778 C -0.09597 0.07171 -0.06004 0.03979 -0.05709 -0.01087 C -0.05501 -0.05621 -0.07601 -0.10016 -0.10899 -0.10293 C -0.13797 -0.10548 -0.16695 -0.08142 -0.16903 -0.04279 C -0.17094 -0.00948 -0.15602 0.02244 -0.13207 0.02522 C -0.11194 0.02776 -0.09094 0.01319 -0.09007 -0.01341 C -0.08799 -0.03493 -0.09597 -0.0576 -0.11107 -0.06014 C -0.12304 -0.06014 -0.13502 -0.05482 -0.13693 -0.04025 C -0.13797 -0.03076 -0.13606 -0.02151 -0.12999 -0.01758 C -0.12704 -0.01619 -0.12495 -0.01619 -0.122 -0.01758 " pathEditMode="relative" rAng="0" ptsTypes="fffffffffffffffff">
+                                      <p:cBhvr>
+                                        <p:cTn id="12" dur="250" fill="hold"/>
+                                        <p:tgtEl>
+                                          <p:spTgt spid="6"/>
+                                        </p:tgtEl>
+                                        <p:attrNameLst>
+                                          <p:attrName>ppt_x</p:attrName>
+                                          <p:attrName>ppt_y</p:attrName>
+                                        </p:attrNameLst>
+                                      </p:cBhvr>
+                                      <p:rCtr x="-12096" y="-2336"/>
+                                    </p:animMotion>
+                                  </p:childTnLst>
+                                </p:cTn>
+                              </p:par>
+                            </p:childTnLst>
+                          </p:cTn>
+                        </p:par>
+                        <p:par>
+                          <p:cTn id="13" fill="hold">
+                            <p:stCondLst>
+                              <p:cond delay="1060"/>
+                            </p:stCondLst>
+                            <p:childTnLst>
+                              <p:par>
+                                <p:cTn id="14" presetID="0" presetClass="path" presetSubtype="0" accel="50000" decel="50000" fill="hold" nodeType="afterEffect">
+                                  <p:stCondLst>
+                                    <p:cond delay="0"/>
+                                  </p:stCondLst>
+                                  <p:childTnLst>
+                                    <p:animMotion origin="layout" path="M 9.28844E-6 -1.35785E-6 C -0.0026 -0.03863 -0.017 -0.10872 0.01406 -0.13463 C 0.02187 -0.14133 0.03177 -0.14203 0.04079 -0.14573 C 0.09945 -0.13763 0.10622 -0.1455 0.14735 -0.12144 C 0.16071 -0.11358 0.18518 -0.0916 0.18518 -0.0916 C 0.18414 -0.0997 0.18067 -0.10802 0.18241 -0.11589 C 0.18657 -0.13648 0.21 -0.15244 0.22163 -0.15891 C 0.25599 -0.17858 0.26831 -0.17696 0.3058 -0.1832 C 0.32021 -0.18205 0.33513 -0.18482 0.34919 -0.1795 C 0.35197 -0.17858 0.3485 -0.17094 0.34624 -0.16817 C 0.34155 -0.16238 0.33513 -0.15938 0.32958 -0.15498 C 0.32541 -0.15891 0.31621 -0.15984 0.31708 -0.16632 C 0.31795 -0.17441 0.3268 -0.1765 0.33253 -0.1795 C 0.34607 -0.18714 0.35978 -0.19477 0.37453 -0.19801 C 0.39987 -0.20402 0.56908 -0.21836 0.5722 -0.2186 C 0.64561 -0.23224 0.71625 -0.25329 0.78966 -0.23178 C 0.79105 -0.22368 0.79643 -0.21513 0.79383 -0.20749 C 0.78723 -0.18945 0.75651 -0.16701 0.74471 -0.15891 C 0.74107 -0.1566 0.75148 -0.1647 0.7546 -0.16817 C 0.7612 -0.17626 0.77717 -0.20102 0.7855 -0.20564 C 0.82142 -0.22715 0.8957 -0.21836 0.92017 -0.2186 C 0.96113 -0.2216 1.00244 -0.22322 1.04357 -0.22808 C 1.07567 -0.25075 1.10865 -0.27249 1.14457 -0.28221 C 1.16644 -0.28845 1.16314 -0.291 1.17113 -0.28036 " pathEditMode="relative" ptsTypes="fffffffffffffffffffffffA">
+                                      <p:cBhvr>
+                                        <p:cTn id="15" dur="6000" fill="hold"/>
+                                        <p:tgtEl>
+                                          <p:spTgt spid="6"/>
+                                        </p:tgtEl>
+                                        <p:attrNameLst>
+                                          <p:attrName>ppt_x</p:attrName>
+                                          <p:attrName>ppt_y</p:attrName>
+                                        </p:attrNameLst>
+                                      </p:cBhvr>
+                                    </p:animMotion>
+                                  </p:childTnLst>
+                                </p:cTn>
+                              </p:par>
+                            </p:childTnLst>
+                          </p:cTn>
+                        </p:par>
+                        <p:par>
+                          <p:cTn id="16" fill="hold">
+                            <p:stCondLst>
+                              <p:cond delay="7060"/>
+                            </p:stCondLst>
+                            <p:childTnLst>
+                              <p:par>
+                                <p:cTn id="17" presetID="0" presetClass="path" presetSubtype="0" accel="50000" decel="50000" fill="hold" nodeType="afterEffect">
+                                  <p:stCondLst>
+                                    <p:cond delay="0"/>
+                                  </p:stCondLst>
+                                  <p:childTnLst>
+                                    <p:animMotion origin="layout" path="M 4.23464E-7 1.91996E-7 C -0.00139 0.00046 -0.00278 0.00138 -0.00416 0.00185 C -0.00746 0.00254 -0.01093 0.00231 -0.01406 0.0037 C -0.01579 0.00416 -0.01683 0.00624 -0.01822 0.0074 C -0.02395 0.0111 -0.03211 0.01249 -0.03783 0.0148 C -0.05259 0.0266 -0.03697 0.0155 -0.05328 0.02243 C -0.07619 0.03169 -0.08469 0.03678 -0.1109 0.03932 C -0.12062 0.02614 -0.12634 0.00601 -0.13051 -0.01134 C -0.1404 -0.0081 -0.14786 0.00462 -0.15706 0.0111 C -0.20305 0.0421 -0.24991 0.07333 -0.30163 0.07841 C -0.32385 0.08258 -0.33929 0.07286 -0.35908 0.06361 C -0.39396 0.04719 -0.43041 0.03562 -0.46702 0.03169 C -0.46893 0.03215 -0.47449 0.03192 -0.47275 0.03354 C -0.46893 0.03701 -0.44898 0.04672 -0.44186 0.05042 C -0.43908 0.05343 -0.43613 0.05621 -0.43336 0.05968 C -0.43006 0.06384 -0.42364 0.07286 -0.42364 0.07286 C -0.42086 0.07217 -0.41774 0.07286 -0.41513 0.07101 C -0.41184 0.06824 -0.4068 0.05968 -0.4068 0.05968 C -0.42138 0.0576 -0.43474 0.05713 -0.4488 0.06361 C -0.44568 0.06477 -0.43856 0.06268 -0.43908 0.06731 C -0.43978 0.07263 -0.44655 0.07217 -0.45019 0.07471 C -0.47154 0.0879 -0.49288 0.09414 -0.51614 0.09715 C -0.53106 0.11011 -0.50746 0.13648 -0.49653 0.14018 C -0.52239 0.16262 -0.49445 0.14064 -0.52881 0.15891 C -0.55901 0.17488 -0.5597 0.17603 -0.57931 0.19061 C -0.58417 0.21027 -0.57792 0.1802 -0.57792 0.20194 C -0.57792 0.22276 -0.6109 0.21489 -0.61298 0.21489 " pathEditMode="relative" ptsTypes="ffffffffffffffffffffffffffA">
+                                      <p:cBhvr>
+                                        <p:cTn id="18" dur="870" fill="hold"/>
+                                        <p:tgtEl>
+                                          <p:spTgt spid="4"/>
+                                        </p:tgtEl>
+                                        <p:attrNameLst>
+                                          <p:attrName>ppt_x</p:attrName>
+                                          <p:attrName>ppt_y</p:attrName>
+                                        </p:attrNameLst>
+                                      </p:cBhvr>
+                                    </p:animMotion>
+                                  </p:childTnLst>
+                                </p:cTn>
+                              </p:par>
+                            </p:childTnLst>
+                          </p:cTn>
+                        </p:par>
+                        <p:par>
+                          <p:cTn id="19" fill="hold">
+                            <p:stCondLst>
+                              <p:cond delay="7930"/>
+                            </p:stCondLst>
+                            <p:childTnLst>
+                              <p:par>
+                                <p:cTn id="20" presetID="0" presetClass="path" presetSubtype="0" accel="50000" decel="50000" fill="hold" nodeType="afterEffect">
+                                  <p:stCondLst>
+                                    <p:cond delay="0"/>
+                                  </p:stCondLst>
+                                  <p:childTnLst>
+                                    <p:animMotion origin="layout" path="M -7.63624E-8 -4.34189E-6 C 0.01024 -0.00069 0.02048 0.00046 0.03072 -0.00185 C 0.05675 -0.00833 0.09111 -0.05112 0.10656 -0.07842 C 0.10743 -0.08235 0.10777 -0.08628 0.10934 -0.08975 C 0.1102 -0.09207 0.11246 -0.09299 0.1135 -0.0953 C 0.11454 -0.09831 0.11367 -0.10178 0.11489 -0.10456 C 0.11715 -0.11103 0.122 -0.11127 0.12617 -0.11404 C 0.13485 -0.12052 0.14162 -0.12769 0.15133 -0.1307 C 0.15567 -0.12538 0.15689 -0.12168 0.16262 -0.11774 C 0.19229 -0.12283 0.21815 -0.14481 0.24818 -0.15128 C 0.25599 -0.15082 0.26397 -0.15105 0.27195 -0.14943 C 0.27351 -0.1492 0.27733 -0.14758 0.27629 -0.14573 C 0.2697 -0.13463 0.24297 -0.12121 0.2369 -0.11774 C 0.15342 -0.07402 0.23776 -0.12029 0.14717 -0.07842 C 0.13068 -0.07102 0.10621 -0.05876 0.09111 -0.04303 C 0.08955 -0.04164 0.09476 -0.04441 0.09667 -0.04488 C 0.09892 -0.04557 0.10135 -0.04626 0.10378 -0.04673 C 0.10604 -0.04626 0.10968 -0.04788 0.11072 -0.04488 C 0.1109 -0.04418 0.10881 -0.02406 0.10795 -0.02059 C 0.10101 0.00416 0.09111 0.00995 0.08122 0.03007 C 0.07497 0.0421 0.07202 0.05552 0.06872 0.06916 C 0.0682 0.07657 0.06925 0.08443 0.06734 0.0916 C 0.06647 0.09392 0.06334 0.0923 0.06161 0.09345 C 0.05241 0.09831 0.05033 0.10247 0.04061 0.10479 C 0.03332 0.10941 0.02568 0.11173 0.01822 0.11589 C 0.0092 0.12769 0.01267 0.12144 0.00694 0.13463 C 0.00243 0.15822 0.01753 0.16771 0.03072 0.17765 C 0.06872 0.20634 0.06196 0.20472 0.10378 0.20749 C 0.15116 0.22299 0.08938 0.20449 0.19767 0.21513 C 0.21364 0.21652 0.22648 0.23016 0.24123 0.23733 C 0.24991 0.2415 0.25859 0.24312 0.26779 0.24497 C 0.29122 0.25538 0.27247 0.25052 0.32246 0.24867 C 0.32801 0.24682 0.33374 0.24543 0.33929 0.24312 C 0.34224 0.24173 0.34779 0.23733 0.34779 0.23733 " pathEditMode="relative" ptsTypes="fffffffffffffffffffffffffffffffffA">
+                                      <p:cBhvr>
+                                        <p:cTn id="21" dur="1000" fill="hold"/>
+                                        <p:tgtEl>
+                                          <p:spTgt spid="5"/>
+                                        </p:tgtEl>
+                                        <p:attrNameLst>
+                                          <p:attrName>ppt_x</p:attrName>
+                                          <p:attrName>ppt_y</p:attrName>
+                                        </p:attrNameLst>
+                                      </p:cBhvr>
+                                    </p:animMotion>
+                                  </p:childTnLst>
+                                </p:cTn>
+                              </p:par>
+                            </p:childTnLst>
+                          </p:cTn>
+                        </p:par>
+                      </p:childTnLst>
+                    </p:cTn>
+                  </p:par>
+                </p:childTnLst>
+              </p:cTn>
+              <p:prevCondLst>
+                <p:cond evt="onPrev" delay="0">
+                  <p:tgtEl>
+                    <p:sldTgt/>
+                  </p:tgtEl>
+                </p:cond>
+              </p:prevCondLst>
+              <p:nextCondLst>
+                <p:cond evt="onNext" delay="0">
+                  <p:tgtEl>
+                    <p:sldTgt/>
+                  </p:tgtEl>
+                </p:cond>
+              </p:nextCondLst>
+            </p:seq>
+          </p:childTnLst>
+        </p:cTn>
       </p:par>
     </p:tnLst>
   </p:timing>
@@ -5479,266 +5754,80 @@
           <a:chExt cx="0" cy="0"/>
         </a:xfrm>
       </p:grpSpPr>
-      <p:pic>
-        <p:nvPicPr>
-          <p:cNvPr id="4" name="Content Placeholder 3"/>
-          <p:cNvPicPr>
-            <a:picLocks noGrp="1" noChangeAspect="1"/>
-          </p:cNvPicPr>
+      <p:sp>
+        <p:nvSpPr>
+          <p:cNvPr id="2" name="Title 1"/>
+          <p:cNvSpPr>
+            <a:spLocks noGrp="1"/>
+          </p:cNvSpPr>
+          <p:nvPr>
+            <p:ph type="title"/>
+          </p:nvPr>
+        </p:nvSpPr>
+        <p:spPr/>
+        <p:txBody>
+          <a:bodyPr/>
+          <a:lstStyle/>
+          <a:p>
+            <a:r>
+              <a:rPr lang="en-US" dirty="0" smtClean="0"/>
+              <a:t>“</a:t>
+            </a:r>
+            <a:r>
+              <a:rPr lang="en-US" smtClean="0"/>
+              <a:t>Full Version”</a:t>
+            </a:r>
+            <a:endParaRPr lang="en-US"/>
+          </a:p>
+        </p:txBody>
+      </p:sp>
+      <p:sp>
+        <p:nvSpPr>
+          <p:cNvPr id="3" name="Content Placeholder 2"/>
+          <p:cNvSpPr>
+            <a:spLocks noGrp="1"/>
+          </p:cNvSpPr>
           <p:nvPr>
             <p:ph idx="1"/>
           </p:nvPr>
-        </p:nvPicPr>
-        <p:blipFill>
-          <a:blip r:embed="rId2"/>
-          <a:srcRect l="-46685" r="-46685"/>
-          <a:stretch>
-            <a:fillRect/>
-          </a:stretch>
-        </p:blipFill>
+        </p:nvSpPr>
         <p:spPr>
           <a:xfrm>
-            <a:off x="1065255" y="3778250"/>
-            <a:ext cx="4697369" cy="2797564"/>
+            <a:off x="822960" y="1100628"/>
+            <a:ext cx="7520940" cy="3579849"/>
           </a:xfrm>
         </p:spPr>
-      </p:pic>
-      <p:sp>
-        <p:nvSpPr>
-          <p:cNvPr id="2" name="Title 1"/>
-          <p:cNvSpPr>
-            <a:spLocks noGrp="1"/>
-          </p:cNvSpPr>
-          <p:nvPr>
-            <p:ph type="title"/>
-          </p:nvPr>
-        </p:nvSpPr>
-        <p:spPr>
-          <a:xfrm>
-            <a:off x="822960" y="365760"/>
-            <a:ext cx="7520940" cy="548640"/>
-          </a:xfrm>
-        </p:spPr>
         <p:txBody>
           <a:bodyPr/>
           <a:lstStyle/>
           <a:p>
             <a:r>
               <a:rPr lang="en-US" dirty="0" smtClean="0"/>
-              <a:t>Done So Far</a:t>
-            </a:r>
-            <a:endParaRPr lang="en-US" dirty="0"/>
-          </a:p>
-        </p:txBody>
-      </p:sp>
-      <p:sp>
-        <p:nvSpPr>
-          <p:cNvPr id="12" name="TextBox 11"/>
-          <p:cNvSpPr txBox="1"/>
-          <p:nvPr/>
-        </p:nvSpPr>
-        <p:spPr>
-          <a:xfrm>
-            <a:off x="166779" y="1321252"/>
-            <a:ext cx="8691471" cy="2031325"/>
-          </a:xfrm>
-          <a:prstGeom prst="rect">
-            <a:avLst/>
-          </a:prstGeom>
-          <a:noFill/>
-        </p:spPr>
-        <p:txBody>
-          <a:bodyPr wrap="square" rtlCol="0">
-            <a:spAutoFit/>
-          </a:bodyPr>
-          <a:lstStyle/>
-          <a:p>
-            <a:pPr marL="285750" indent="-285750">
-              <a:buFont typeface="Arial"/>
-              <a:buChar char="•"/>
-            </a:pPr>
+              <a:t>The full </a:t>
+            </a:r>
             <a:r>
               <a:rPr lang="en-US" dirty="0" smtClean="0"/>
-              <a:t>So far we have completed a menu and submenu for the </a:t>
+              <a:t>version of the application </a:t>
             </a:r>
             <a:r>
               <a:rPr lang="en-US" dirty="0" smtClean="0"/>
-              <a:t>exercises. Also</a:t>
+              <a:t>will utilize the included </a:t>
+            </a:r>
+            <a:r>
+              <a:rPr lang="en-US" dirty="0" err="1" smtClean="0"/>
+              <a:t>Xcode</a:t>
             </a:r>
             <a:r>
               <a:rPr lang="en-US" dirty="0" smtClean="0"/>
-              <a:t>, we categorized each exercise to the body parts they </a:t>
+              <a:t> </a:t>
             </a:r>
             <a:r>
               <a:rPr lang="en-US" dirty="0" smtClean="0"/>
-              <a:t>are specific for, </a:t>
+              <a:t>default </a:t>
             </a:r>
             <a:r>
               <a:rPr lang="en-US" dirty="0" smtClean="0"/>
-              <a:t>such as upper body, legs, and </a:t>
-            </a:r>
-            <a:r>
-              <a:rPr lang="en-US" dirty="0" smtClean="0"/>
-              <a:t>core.</a:t>
-            </a:r>
-          </a:p>
-          <a:p>
-            <a:pPr marL="285750" indent="-285750">
-              <a:buFont typeface="Arial"/>
-              <a:buChar char="•"/>
-            </a:pPr>
-            <a:r>
-              <a:rPr lang="en-US" dirty="0" smtClean="0"/>
-              <a:t>We have begun creating a “Workout Queue”, which will allow users to add exercises to an editable list and edit information related to that exercise (</a:t>
-            </a:r>
-            <a:r>
-              <a:rPr lang="en-US" dirty="0" err="1" smtClean="0"/>
-              <a:t>ie</a:t>
-            </a:r>
-            <a:r>
-              <a:rPr lang="en-US" dirty="0" smtClean="0"/>
-              <a:t> reps, time exercised, distance traveled).</a:t>
-            </a:r>
-          </a:p>
-          <a:p>
-            <a:pPr marL="285750" indent="-285750">
-              <a:buFont typeface="Arial"/>
-              <a:buChar char="•"/>
-            </a:pPr>
-            <a:r>
-              <a:rPr lang="en-US" dirty="0" smtClean="0"/>
-              <a:t>Also, we’ve begun to create an alphabetized user interface table view.</a:t>
-            </a:r>
-            <a:endParaRPr lang="en-US" dirty="0" smtClean="0"/>
-          </a:p>
-        </p:txBody>
-      </p:sp>
-    </p:spTree>
-    <p:extLst>
-      <p:ext uri="{BB962C8B-B14F-4D97-AF65-F5344CB8AC3E}">
-        <p14:creationId xmlns:p14="http://schemas.microsoft.com/office/powerpoint/2010/main" val="605547221"/>
-      </p:ext>
-    </p:extLst>
-  </p:cSld>
-  <p:clrMapOvr>
-    <a:masterClrMapping/>
-  </p:clrMapOvr>
-  <mc:AlternateContent xmlns:mc="http://schemas.openxmlformats.org/markup-compatibility/2006" xmlns:p14="http://schemas.microsoft.com/office/powerpoint/2010/main">
-    <mc:Choice Requires="p14">
-      <p:transition spd="slow" p14:dur="2000">
-        <p14:honeycomb/>
-      </p:transition>
-    </mc:Choice>
-    <mc:Fallback xmlns="">
-      <p:transition xmlns:p14="http://schemas.microsoft.com/office/powerpoint/2010/main" spd="slow">
-        <p:fade/>
-      </p:transition>
-    </mc:Fallback>
-  </mc:AlternateContent>
-  <p:timing>
-    <p:tnLst>
-      <p:par>
-        <p:cTn xmlns:p14="http://schemas.microsoft.com/office/powerpoint/2010/main" id="1" dur="indefinite" restart="never" nodeType="tmRoot"/>
-      </p:par>
-    </p:tnLst>
-  </p:timing>
-</p:sld>
-</file>
-
-<file path=ppt/slides/slide6.xml><?xml version="1.0" encoding="utf-8"?>
-<p:sld xmlns:a="http://schemas.openxmlformats.org/drawingml/2006/main" xmlns:r="http://schemas.openxmlformats.org/officeDocument/2006/relationships" xmlns:p="http://schemas.openxmlformats.org/presentationml/2006/main">
-  <p:cSld>
-    <p:spTree>
-      <p:nvGrpSpPr>
-        <p:cNvPr id="1" name=""/>
-        <p:cNvGrpSpPr/>
-        <p:nvPr/>
-      </p:nvGrpSpPr>
-      <p:grpSpPr>
-        <a:xfrm>
-          <a:off x="0" y="0"/>
-          <a:ext cx="0" cy="0"/>
-          <a:chOff x="0" y="0"/>
-          <a:chExt cx="0" cy="0"/>
-        </a:xfrm>
-      </p:grpSpPr>
-      <p:sp>
-        <p:nvSpPr>
-          <p:cNvPr id="2" name="Title 1"/>
-          <p:cNvSpPr>
-            <a:spLocks noGrp="1"/>
-          </p:cNvSpPr>
-          <p:nvPr>
-            <p:ph type="title"/>
-          </p:nvPr>
-        </p:nvSpPr>
-        <p:spPr/>
-        <p:txBody>
-          <a:bodyPr/>
-          <a:lstStyle/>
-          <a:p>
-            <a:r>
-              <a:rPr lang="en-US" dirty="0" smtClean="0"/>
-              <a:t>Expect Done By </a:t>
-            </a:r>
-            <a:r>
-              <a:rPr lang="en-US" dirty="0" smtClean="0"/>
-              <a:t>End</a:t>
-            </a:r>
-            <a:endParaRPr lang="en-US" dirty="0"/>
-          </a:p>
-        </p:txBody>
-      </p:sp>
-      <p:sp>
-        <p:nvSpPr>
-          <p:cNvPr id="3" name="Content Placeholder 2"/>
-          <p:cNvSpPr>
-            <a:spLocks noGrp="1"/>
-          </p:cNvSpPr>
-          <p:nvPr>
-            <p:ph idx="1"/>
-          </p:nvPr>
-        </p:nvSpPr>
-        <p:spPr/>
-        <p:txBody>
-          <a:bodyPr/>
-          <a:lstStyle/>
-          <a:p>
-            <a:pPr marL="285750" indent="-285750">
-              <a:buFont typeface="Arial"/>
-              <a:buChar char="•"/>
-            </a:pPr>
-            <a:r>
-              <a:rPr lang="en-US" dirty="0" smtClean="0"/>
-              <a:t>The </a:t>
-            </a:r>
-            <a:r>
-              <a:rPr lang="en-US" dirty="0"/>
-              <a:t>fully released application will have text segments to guide users through respective workouts. The application will not include video segments or graphs to assist users. However, the text-based documents will feature a variety of images to clarify how to complete individual </a:t>
-            </a:r>
-            <a:r>
-              <a:rPr lang="en-US" dirty="0" smtClean="0"/>
-              <a:t>exercise activities</a:t>
-            </a:r>
-            <a:r>
-              <a:rPr lang="en-US" dirty="0" smtClean="0"/>
-              <a:t>. We also expect to create the previously mentioned “Workout Queue”, which (time </a:t>
-            </a:r>
-            <a:r>
-              <a:rPr lang="en-US" dirty="0"/>
-              <a:t>p</a:t>
-            </a:r>
-            <a:r>
-              <a:rPr lang="en-US" dirty="0" smtClean="0"/>
-              <a:t>ermitting) may incorporate some of the integrations in the following slide (</a:t>
-            </a:r>
-            <a:r>
-              <a:rPr lang="en-US" dirty="0" err="1" smtClean="0"/>
-              <a:t>ie</a:t>
-            </a:r>
-            <a:r>
-              <a:rPr lang="en-US" dirty="0" smtClean="0"/>
-              <a:t> Added labels and fields, data logs, progress tracking integration, etc.)</a:t>
+              <a:t>user interfaces. The application will include core exercises, along with upper and lower body to workouts. The tips section will tell users stretches and what to bring when exercising.</a:t>
             </a:r>
             <a:endParaRPr lang="en-US" dirty="0"/>
           </a:p>
@@ -5760,257 +5849,7 @@
         </p:blipFill>
         <p:spPr>
           <a:xfrm>
-            <a:off x="4127005" y="3835477"/>
-            <a:ext cx="1738870" cy="2612037"/>
-          </a:xfrm>
-          <a:prstGeom prst="rect">
-            <a:avLst/>
-          </a:prstGeom>
-        </p:spPr>
-      </p:pic>
-      <p:pic>
-        <p:nvPicPr>
-          <p:cNvPr id="5" name="Picture 4"/>
-          <p:cNvPicPr>
-            <a:picLocks noChangeAspect="1"/>
-          </p:cNvPicPr>
-          <p:nvPr/>
-        </p:nvPicPr>
-        <p:blipFill>
-          <a:blip r:embed="rId3"/>
-          <a:stretch>
-            <a:fillRect/>
-          </a:stretch>
-        </p:blipFill>
-        <p:spPr>
-          <a:xfrm>
-            <a:off x="6889712" y="3789580"/>
-            <a:ext cx="1621066" cy="2535070"/>
-          </a:xfrm>
-          <a:prstGeom prst="rect">
-            <a:avLst/>
-          </a:prstGeom>
-        </p:spPr>
-      </p:pic>
-      <p:pic>
-        <p:nvPicPr>
-          <p:cNvPr id="6" name="Picture 5"/>
-          <p:cNvPicPr>
-            <a:picLocks noChangeAspect="1"/>
-          </p:cNvPicPr>
-          <p:nvPr/>
-        </p:nvPicPr>
-        <p:blipFill>
-          <a:blip r:embed="rId4"/>
-          <a:stretch>
-            <a:fillRect/>
-          </a:stretch>
-        </p:blipFill>
-        <p:spPr>
-          <a:xfrm>
-            <a:off x="752313" y="4417597"/>
-            <a:ext cx="2683168" cy="1691793"/>
-          </a:xfrm>
-          <a:prstGeom prst="rect">
-            <a:avLst/>
-          </a:prstGeom>
-        </p:spPr>
-      </p:pic>
-    </p:spTree>
-    <p:extLst>
-      <p:ext uri="{BB962C8B-B14F-4D97-AF65-F5344CB8AC3E}">
-        <p14:creationId xmlns:p14="http://schemas.microsoft.com/office/powerpoint/2010/main" val="2171772195"/>
-      </p:ext>
-    </p:extLst>
-  </p:cSld>
-  <p:clrMapOvr>
-    <a:masterClrMapping/>
-  </p:clrMapOvr>
-  <mc:AlternateContent xmlns:mc="http://schemas.openxmlformats.org/markup-compatibility/2006" xmlns:p14="http://schemas.microsoft.com/office/powerpoint/2010/main">
-    <mc:Choice Requires="p14">
-      <p:transition spd="slow" p14:dur="2000">
-        <p14:ferris dir="l"/>
-      </p:transition>
-    </mc:Choice>
-    <mc:Fallback xmlns="">
-      <p:transition xmlns:p14="http://schemas.microsoft.com/office/powerpoint/2010/main" spd="slow">
-        <p:fade/>
-      </p:transition>
-    </mc:Fallback>
-  </mc:AlternateContent>
-  <p:timing>
-    <p:tnLst>
-      <p:par>
-        <p:cTn xmlns:p14="http://schemas.microsoft.com/office/powerpoint/2010/main" id="1" dur="indefinite" restart="never" nodeType="tmRoot"/>
-      </p:par>
-    </p:tnLst>
-  </p:timing>
-</p:sld>
-</file>
-
-<file path=ppt/slides/slide7.xml><?xml version="1.0" encoding="utf-8"?>
-<p:sld xmlns:a="http://schemas.openxmlformats.org/drawingml/2006/main" xmlns:r="http://schemas.openxmlformats.org/officeDocument/2006/relationships" xmlns:p="http://schemas.openxmlformats.org/presentationml/2006/main">
-  <p:cSld>
-    <p:spTree>
-      <p:nvGrpSpPr>
-        <p:cNvPr id="1" name=""/>
-        <p:cNvGrpSpPr/>
-        <p:nvPr/>
-      </p:nvGrpSpPr>
-      <p:grpSpPr>
-        <a:xfrm>
-          <a:off x="0" y="0"/>
-          <a:ext cx="0" cy="0"/>
-          <a:chOff x="0" y="0"/>
-          <a:chExt cx="0" cy="0"/>
-        </a:xfrm>
-      </p:grpSpPr>
-      <p:sp>
-        <p:nvSpPr>
-          <p:cNvPr id="2" name="Title 1"/>
-          <p:cNvSpPr>
-            <a:spLocks noGrp="1"/>
-          </p:cNvSpPr>
-          <p:nvPr>
-            <p:ph type="title"/>
-          </p:nvPr>
-        </p:nvSpPr>
-        <p:spPr/>
-        <p:txBody>
-          <a:bodyPr/>
-          <a:lstStyle/>
-          <a:p>
-            <a:r>
-              <a:rPr lang="en-US" dirty="0" smtClean="0"/>
-              <a:t>“</a:t>
-            </a:r>
-            <a:r>
-              <a:rPr lang="en-US" smtClean="0"/>
-              <a:t>Full Version”</a:t>
-            </a:r>
-            <a:endParaRPr lang="en-US"/>
-          </a:p>
-        </p:txBody>
-      </p:sp>
-      <p:sp>
-        <p:nvSpPr>
-          <p:cNvPr id="3" name="Content Placeholder 2"/>
-          <p:cNvSpPr>
-            <a:spLocks noGrp="1"/>
-          </p:cNvSpPr>
-          <p:nvPr>
-            <p:ph idx="1"/>
-          </p:nvPr>
-        </p:nvSpPr>
-        <p:spPr>
-          <a:xfrm>
-            <a:off x="508000" y="1100628"/>
-            <a:ext cx="8191500" cy="3579849"/>
-          </a:xfrm>
-        </p:spPr>
-        <p:txBody>
-          <a:bodyPr>
-            <a:normAutofit/>
-          </a:bodyPr>
-          <a:lstStyle/>
-          <a:p>
-            <a:pPr>
-              <a:buFont typeface="Arial"/>
-              <a:buChar char="•"/>
-            </a:pPr>
-            <a:r>
-              <a:rPr lang="en-US" dirty="0" smtClean="0"/>
-              <a:t>The full version of the application will utilize the included </a:t>
-            </a:r>
-            <a:r>
-              <a:rPr lang="en-US" dirty="0" err="1" smtClean="0"/>
-              <a:t>Xcode</a:t>
-            </a:r>
-            <a:r>
-              <a:rPr lang="en-US" dirty="0" smtClean="0"/>
-              <a:t> default user interfaces. The application will include core exercises, along with upper and lower body </a:t>
-            </a:r>
-            <a:r>
-              <a:rPr lang="en-US" dirty="0" smtClean="0"/>
-              <a:t>workouts</a:t>
-            </a:r>
-            <a:r>
-              <a:rPr lang="en-US" dirty="0" smtClean="0"/>
-              <a:t>. </a:t>
-            </a:r>
-            <a:r>
-              <a:rPr lang="en-US" dirty="0" smtClean="0"/>
-              <a:t>There will be a tips </a:t>
-            </a:r>
-            <a:r>
-              <a:rPr lang="en-US" dirty="0" smtClean="0"/>
-              <a:t>section </a:t>
-            </a:r>
-            <a:r>
-              <a:rPr lang="en-US" dirty="0" smtClean="0"/>
-              <a:t>that provides </a:t>
-            </a:r>
-            <a:r>
-              <a:rPr lang="en-US" dirty="0" smtClean="0"/>
-              <a:t>users with stretches </a:t>
-            </a:r>
-            <a:r>
-              <a:rPr lang="en-US" dirty="0" smtClean="0"/>
-              <a:t>and </a:t>
-            </a:r>
-            <a:r>
-              <a:rPr lang="en-US" dirty="0" smtClean="0"/>
-              <a:t>recommended items to </a:t>
-            </a:r>
-            <a:r>
-              <a:rPr lang="en-US" dirty="0" smtClean="0"/>
-              <a:t>bring </a:t>
-            </a:r>
-            <a:r>
-              <a:rPr lang="en-US" dirty="0" smtClean="0"/>
-              <a:t>with them when </a:t>
-            </a:r>
-            <a:r>
-              <a:rPr lang="en-US" dirty="0" smtClean="0"/>
-              <a:t>exercising</a:t>
-            </a:r>
-            <a:r>
-              <a:rPr lang="en-US" dirty="0" smtClean="0"/>
-              <a:t>. There will also be an integrated progress tracker, which will take information recorded in the workout queue and graph it in several different types of charts. This will include a graphic view of the entire human body from multiple angles (accessible via a tab interface along the bottom of the screen). This diagram will include highlighted muscle groups with colors assigned based on the frequency with which the user </a:t>
-            </a:r>
-            <a:r>
-              <a:rPr lang="en-US" dirty="0"/>
-              <a:t>has logged (acquired through the workout queue) </a:t>
-            </a:r>
-            <a:r>
-              <a:rPr lang="en-US" dirty="0" smtClean="0"/>
-              <a:t>exercising those specific muscle groups. The workout queue will contain added features to display the pertinent data entered in the workout in a label alongside the item in the table view so the user will not need to acces</a:t>
-            </a:r>
-            <a:r>
-              <a:rPr lang="en-US" dirty="0" smtClean="0"/>
-              <a:t>s the view in order to check their previously entered information. Previously entered information in the aforementioned view will be stored in a scrollable table so that the user can view stored data logs.</a:t>
-            </a:r>
-            <a:endParaRPr lang="en-US" dirty="0"/>
-          </a:p>
-        </p:txBody>
-      </p:sp>
-      <p:pic>
-        <p:nvPicPr>
-          <p:cNvPr id="4" name="Picture 3"/>
-          <p:cNvPicPr>
-            <a:picLocks noChangeAspect="1"/>
-          </p:cNvPicPr>
-          <p:nvPr/>
-        </p:nvPicPr>
-        <p:blipFill>
-          <a:blip r:embed="rId2"/>
-          <a:stretch>
-            <a:fillRect/>
-          </a:stretch>
-        </p:blipFill>
-        <p:spPr>
-          <a:xfrm>
-            <a:off x="4058474" y="4438431"/>
+            <a:off x="2883724" y="3041431"/>
             <a:ext cx="2876579" cy="2302902"/>
           </a:xfrm>
           <a:prstGeom prst="rect">
@@ -6030,8 +5869,8 @@
   </p:clrMapOvr>
   <mc:AlternateContent xmlns:mc="http://schemas.openxmlformats.org/markup-compatibility/2006">
     <mc:Choice xmlns:p14="http://schemas.microsoft.com/office/powerpoint/2010/main" Requires="p14">
-      <p:transition spd="slow" p14:dur="1600">
-        <p14:prism isContent="1" isInverted="1"/>
+      <p:transition spd="slow" p14:dur="2000">
+        <p14:ferris dir="l"/>
       </p:transition>
     </mc:Choice>
     <mc:Fallback>

</xml_diff>